<commit_message>
seminar kemajuan aina dan stentiford
</commit_message>
<xml_diff>
--- a/1. presentasi/PEMBELAJARAN HURUF DAN KALIMAT ARAB BERBASIS PENGENALAN CITRA.pptx
+++ b/1. presentasi/PEMBELAJARAN HURUF DAN KALIMAT ARAB BERBASIS PENGENALAN CITRA.pptx
@@ -5,7 +5,7 @@
     <p:sldMasterId id="2147483684" r:id="rId1"/>
   </p:sldMasterIdLst>
   <p:notesMasterIdLst>
-    <p:notesMasterId r:id="rId64"/>
+    <p:notesMasterId r:id="rId78"/>
   </p:notesMasterIdLst>
   <p:sldIdLst>
     <p:sldId id="256" r:id="rId2"/>
@@ -69,7 +69,21 @@
     <p:sldId id="323" r:id="rId60"/>
     <p:sldId id="318" r:id="rId61"/>
     <p:sldId id="326" r:id="rId62"/>
-    <p:sldId id="327" r:id="rId63"/>
+    <p:sldId id="330" r:id="rId63"/>
+    <p:sldId id="331" r:id="rId64"/>
+    <p:sldId id="332" r:id="rId65"/>
+    <p:sldId id="327" r:id="rId66"/>
+    <p:sldId id="333" r:id="rId67"/>
+    <p:sldId id="328" r:id="rId68"/>
+    <p:sldId id="329" r:id="rId69"/>
+    <p:sldId id="334" r:id="rId70"/>
+    <p:sldId id="335" r:id="rId71"/>
+    <p:sldId id="336" r:id="rId72"/>
+    <p:sldId id="339" r:id="rId73"/>
+    <p:sldId id="340" r:id="rId74"/>
+    <p:sldId id="341" r:id="rId75"/>
+    <p:sldId id="338" r:id="rId76"/>
+    <p:sldId id="342" r:id="rId77"/>
   </p:sldIdLst>
   <p:sldSz cx="12192000" cy="6858000"/>
   <p:notesSz cx="6858000" cy="9144000"/>
@@ -262,7 +276,7 @@
           <a:p>
             <a:fld id="{F619E0AC-3D4F-4374-89F6-BCB92F73B24F}" type="datetimeFigureOut">
               <a:rPr lang="en-US" smtClean="0"/>
-              <a:t>10/12/2017</a:t>
+              <a:t>10/18/2017</a:t>
             </a:fld>
             <a:endParaRPr lang="en-US"/>
           </a:p>
@@ -810,7 +824,7 @@
             <a:fld id="{87DE6118-2437-4B30-8E3C-4D2BE6020583}" type="datetimeFigureOut">
               <a:rPr lang="en-US" smtClean="0"/>
               <a:pPr/>
-              <a:t>10/12/2017</a:t>
+              <a:t>10/18/2017</a:t>
             </a:fld>
             <a:endParaRPr lang="en-US" dirty="0"/>
           </a:p>
@@ -1032,7 +1046,7 @@
           <a:p>
             <a:fld id="{87DE6118-2437-4B30-8E3C-4D2BE6020583}" type="datetimeFigureOut">
               <a:rPr lang="en-US" smtClean="0"/>
-              <a:t>10/12/2017</a:t>
+              <a:t>10/18/2017</a:t>
             </a:fld>
             <a:endParaRPr lang="en-US" dirty="0"/>
           </a:p>
@@ -1212,7 +1226,7 @@
           <a:p>
             <a:fld id="{87DE6118-2437-4B30-8E3C-4D2BE6020583}" type="datetimeFigureOut">
               <a:rPr lang="en-US" smtClean="0"/>
-              <a:t>10/12/2017</a:t>
+              <a:t>10/18/2017</a:t>
             </a:fld>
             <a:endParaRPr lang="en-US" dirty="0"/>
           </a:p>
@@ -1382,7 +1396,7 @@
           <a:p>
             <a:fld id="{87DE6118-2437-4B30-8E3C-4D2BE6020583}" type="datetimeFigureOut">
               <a:rPr lang="en-US" smtClean="0"/>
-              <a:t>10/12/2017</a:t>
+              <a:t>10/18/2017</a:t>
             </a:fld>
             <a:endParaRPr lang="en-US" dirty="0"/>
           </a:p>
@@ -1634,7 +1648,7 @@
             <a:fld id="{87DE6118-2437-4B30-8E3C-4D2BE6020583}" type="datetimeFigureOut">
               <a:rPr lang="en-US" smtClean="0"/>
               <a:pPr/>
-              <a:t>10/12/2017</a:t>
+              <a:t>10/18/2017</a:t>
             </a:fld>
             <a:endParaRPr lang="en-US" dirty="0"/>
           </a:p>
@@ -1958,7 +1972,7 @@
           <a:p>
             <a:fld id="{87DE6118-2437-4B30-8E3C-4D2BE6020583}" type="datetimeFigureOut">
               <a:rPr lang="en-US" smtClean="0"/>
-              <a:t>10/12/2017</a:t>
+              <a:t>10/18/2017</a:t>
             </a:fld>
             <a:endParaRPr lang="en-US" dirty="0"/>
           </a:p>
@@ -2382,7 +2396,7 @@
           <a:p>
             <a:fld id="{87DE6118-2437-4B30-8E3C-4D2BE6020583}" type="datetimeFigureOut">
               <a:rPr lang="en-US" smtClean="0"/>
-              <a:t>10/12/2017</a:t>
+              <a:t>10/18/2017</a:t>
             </a:fld>
             <a:endParaRPr lang="en-US" dirty="0"/>
           </a:p>
@@ -2500,7 +2514,7 @@
           <a:p>
             <a:fld id="{87DE6118-2437-4B30-8E3C-4D2BE6020583}" type="datetimeFigureOut">
               <a:rPr lang="en-US" smtClean="0"/>
-              <a:t>10/12/2017</a:t>
+              <a:t>10/18/2017</a:t>
             </a:fld>
             <a:endParaRPr lang="en-US" dirty="0"/>
           </a:p>
@@ -2595,7 +2609,7 @@
           <a:p>
             <a:fld id="{87DE6118-2437-4B30-8E3C-4D2BE6020583}" type="datetimeFigureOut">
               <a:rPr lang="en-US" smtClean="0"/>
-              <a:t>10/12/2017</a:t>
+              <a:t>10/18/2017</a:t>
             </a:fld>
             <a:endParaRPr lang="en-US" dirty="0"/>
           </a:p>
@@ -2886,7 +2900,7 @@
             <a:fld id="{87DE6118-2437-4B30-8E3C-4D2BE6020583}" type="datetimeFigureOut">
               <a:rPr lang="en-US" smtClean="0"/>
               <a:pPr/>
-              <a:t>10/12/2017</a:t>
+              <a:t>10/18/2017</a:t>
             </a:fld>
             <a:endParaRPr lang="en-US" dirty="0"/>
           </a:p>
@@ -3160,7 +3174,7 @@
             <a:fld id="{87DE6118-2437-4B30-8E3C-4D2BE6020583}" type="datetimeFigureOut">
               <a:rPr lang="en-US" smtClean="0"/>
               <a:pPr/>
-              <a:t>10/12/2017</a:t>
+              <a:t>10/18/2017</a:t>
             </a:fld>
             <a:endParaRPr lang="en-US" dirty="0"/>
           </a:p>
@@ -3415,7 +3429,7 @@
             <a:fld id="{87DE6118-2437-4B30-8E3C-4D2BE6020583}" type="datetimeFigureOut">
               <a:rPr lang="en-US" smtClean="0"/>
               <a:pPr/>
-              <a:t>10/12/2017</a:t>
+              <a:t>10/18/2017</a:t>
             </a:fld>
             <a:endParaRPr lang="en-US" dirty="0"/>
           </a:p>
@@ -27726,21 +27740,98 @@
             <p:ph type="title"/>
           </p:nvPr>
         </p:nvSpPr>
-        <p:spPr/>
+        <p:spPr>
+          <a:xfrm>
+            <a:off x="652734" y="447368"/>
+            <a:ext cx="11116479" cy="555523"/>
+          </a:xfrm>
+        </p:spPr>
         <p:txBody>
-          <a:bodyPr/>
+          <a:bodyPr>
+            <a:noAutofit/>
+          </a:bodyPr>
           <a:lstStyle/>
           <a:p>
-            <a:endParaRPr lang="en-US"/>
+            <a:pPr algn="ctr"/>
+            <a:r>
+              <a:rPr lang="en-US" sz="2800" dirty="0" err="1">
+                <a:latin typeface="Calibri" panose="020F0502020204030204" pitchFamily="34" charset="0"/>
+                <a:cs typeface="Calibri" panose="020F0502020204030204" pitchFamily="34" charset="0"/>
+              </a:rPr>
+              <a:t>Hasil</a:t>
+            </a:r>
+            <a:r>
+              <a:rPr lang="en-US" sz="2800" dirty="0">
+                <a:latin typeface="Calibri" panose="020F0502020204030204" pitchFamily="34" charset="0"/>
+                <a:cs typeface="Calibri" panose="020F0502020204030204" pitchFamily="34" charset="0"/>
+              </a:rPr>
+              <a:t> </a:t>
+            </a:r>
+            <a:r>
+              <a:rPr lang="en-US" sz="2800" dirty="0" err="1">
+                <a:latin typeface="Calibri" panose="020F0502020204030204" pitchFamily="34" charset="0"/>
+                <a:cs typeface="Calibri" panose="020F0502020204030204" pitchFamily="34" charset="0"/>
+              </a:rPr>
+              <a:t>Pengenalan</a:t>
+            </a:r>
+            <a:r>
+              <a:rPr lang="en-US" sz="2800" dirty="0">
+                <a:latin typeface="Calibri" panose="020F0502020204030204" pitchFamily="34" charset="0"/>
+                <a:cs typeface="Calibri" panose="020F0502020204030204" pitchFamily="34" charset="0"/>
+              </a:rPr>
+              <a:t> </a:t>
+            </a:r>
+            <a:r>
+              <a:rPr lang="en-US" sz="2800" dirty="0" err="1">
+                <a:latin typeface="Calibri" panose="020F0502020204030204" pitchFamily="34" charset="0"/>
+                <a:cs typeface="Calibri" panose="020F0502020204030204" pitchFamily="34" charset="0"/>
+              </a:rPr>
+              <a:t>Huruf</a:t>
+            </a:r>
+            <a:r>
+              <a:rPr lang="en-US" sz="2800" dirty="0">
+                <a:latin typeface="Calibri" panose="020F0502020204030204" pitchFamily="34" charset="0"/>
+                <a:cs typeface="Calibri" panose="020F0502020204030204" pitchFamily="34" charset="0"/>
+              </a:rPr>
+              <a:t> Arab Tunggal </a:t>
+            </a:r>
+            <a:r>
+              <a:rPr lang="en-US" sz="2800" dirty="0" err="1">
+                <a:latin typeface="Calibri" panose="020F0502020204030204" pitchFamily="34" charset="0"/>
+                <a:cs typeface="Calibri" panose="020F0502020204030204" pitchFamily="34" charset="0"/>
+              </a:rPr>
+              <a:t>dengan</a:t>
+            </a:r>
+            <a:r>
+              <a:rPr lang="en-US" sz="2800" dirty="0">
+                <a:latin typeface="Calibri" panose="020F0502020204030204" pitchFamily="34" charset="0"/>
+                <a:cs typeface="Calibri" panose="020F0502020204030204" pitchFamily="34" charset="0"/>
+              </a:rPr>
+              <a:t> Font Arial , </a:t>
+            </a:r>
+            <a:r>
+              <a:rPr lang="en-US" sz="2800" dirty="0" err="1">
+                <a:latin typeface="Calibri" panose="020F0502020204030204" pitchFamily="34" charset="0"/>
+                <a:cs typeface="Calibri" panose="020F0502020204030204" pitchFamily="34" charset="0"/>
+              </a:rPr>
+              <a:t>Akurasi</a:t>
+            </a:r>
+            <a:r>
+              <a:rPr lang="en-US" sz="2800" dirty="0">
+                <a:latin typeface="Calibri" panose="020F0502020204030204" pitchFamily="34" charset="0"/>
+                <a:cs typeface="Calibri" panose="020F0502020204030204" pitchFamily="34" charset="0"/>
+              </a:rPr>
+              <a:t> 100%</a:t>
+            </a:r>
           </a:p>
         </p:txBody>
       </p:sp>
       <p:pic>
         <p:nvPicPr>
-          <p:cNvPr id="5" name="Content Placeholder 4">
+          <p:cNvPr id="6" name="Content Placeholder 5">
             <a:extLst>
               <a:ext uri="{FF2B5EF4-FFF2-40B4-BE49-F238E27FC236}">
-                <a16:creationId xmlns:a16="http://schemas.microsoft.com/office/drawing/2014/main" id="{6CB53048-5924-4705-BD08-ECB81815CBEB}"/>
+                <a16:creationId xmlns:a16="http://schemas.microsoft.com/office/drawing/2014/main" id="{EE36BDAE-D01C-4B86-830E-AE805CC49B03}"/>
               </a:ext>
             </a:extLst>
           </p:cNvPr>
@@ -27759,17 +27850,17 @@
         </p:blipFill>
         <p:spPr>
           <a:xfrm>
-            <a:off x="5701733" y="2722787"/>
-            <a:ext cx="2070667" cy="2998897"/>
+            <a:off x="6209909" y="1400432"/>
+            <a:ext cx="5071796" cy="4793889"/>
           </a:xfrm>
         </p:spPr>
       </p:pic>
       <p:pic>
         <p:nvPicPr>
-          <p:cNvPr id="7" name="Picture 6">
+          <p:cNvPr id="8" name="Picture 7">
             <a:extLst>
               <a:ext uri="{FF2B5EF4-FFF2-40B4-BE49-F238E27FC236}">
-                <a16:creationId xmlns:a16="http://schemas.microsoft.com/office/drawing/2014/main" id="{5CB11E23-EB4C-4B26-9786-DC311B98CCDF}"/>
+                <a16:creationId xmlns:a16="http://schemas.microsoft.com/office/drawing/2014/main" id="{D8148565-6A05-4CE0-BB58-B57AC2CAEE52}"/>
               </a:ext>
             </a:extLst>
           </p:cNvPr>
@@ -27786,8 +27877,519 @@
         </p:blipFill>
         <p:spPr>
           <a:xfrm>
-            <a:off x="1378403" y="1937375"/>
-            <a:ext cx="3577055" cy="4317135"/>
+            <a:off x="652734" y="1400433"/>
+            <a:ext cx="5239832" cy="4793889"/>
+          </a:xfrm>
+          <a:prstGeom prst="rect">
+            <a:avLst/>
+          </a:prstGeom>
+        </p:spPr>
+      </p:pic>
+    </p:spTree>
+    <p:extLst>
+      <p:ext uri="{BB962C8B-B14F-4D97-AF65-F5344CB8AC3E}">
+        <p14:creationId xmlns:p14="http://schemas.microsoft.com/office/powerpoint/2010/main" val="2850366061"/>
+      </p:ext>
+    </p:extLst>
+  </p:cSld>
+  <p:clrMapOvr>
+    <a:masterClrMapping/>
+  </p:clrMapOvr>
+</p:sld>
+</file>
+
+<file path=ppt/slides/slide63.xml><?xml version="1.0" encoding="utf-8"?>
+<p:sld xmlns:a="http://schemas.openxmlformats.org/drawingml/2006/main" xmlns:r="http://schemas.openxmlformats.org/officeDocument/2006/relationships" xmlns:p="http://schemas.openxmlformats.org/presentationml/2006/main">
+  <p:cSld>
+    <p:spTree>
+      <p:nvGrpSpPr>
+        <p:cNvPr id="1" name=""/>
+        <p:cNvGrpSpPr/>
+        <p:nvPr/>
+      </p:nvGrpSpPr>
+      <p:grpSpPr>
+        <a:xfrm>
+          <a:off x="0" y="0"/>
+          <a:ext cx="0" cy="0"/>
+          <a:chOff x="0" y="0"/>
+          <a:chExt cx="0" cy="0"/>
+        </a:xfrm>
+      </p:grpSpPr>
+      <p:sp>
+        <p:nvSpPr>
+          <p:cNvPr id="2" name="Title 1">
+            <a:extLst>
+              <a:ext uri="{FF2B5EF4-FFF2-40B4-BE49-F238E27FC236}">
+                <a16:creationId xmlns:a16="http://schemas.microsoft.com/office/drawing/2014/main" id="{50A2B6B5-6DC0-442A-A543-F2324A8445F9}"/>
+              </a:ext>
+            </a:extLst>
+          </p:cNvPr>
+          <p:cNvSpPr>
+            <a:spLocks noGrp="1"/>
+          </p:cNvSpPr>
+          <p:nvPr>
+            <p:ph type="title"/>
+          </p:nvPr>
+        </p:nvSpPr>
+        <p:spPr>
+          <a:xfrm>
+            <a:off x="398206" y="447368"/>
+            <a:ext cx="11358518" cy="555523"/>
+          </a:xfrm>
+        </p:spPr>
+        <p:txBody>
+          <a:bodyPr>
+            <a:noAutofit/>
+          </a:bodyPr>
+          <a:lstStyle/>
+          <a:p>
+            <a:pPr algn="ctr"/>
+            <a:r>
+              <a:rPr lang="en-US" sz="2800" dirty="0" err="1"/>
+              <a:t>Hasil</a:t>
+            </a:r>
+            <a:r>
+              <a:rPr lang="en-US" sz="2800" dirty="0"/>
+              <a:t> </a:t>
+            </a:r>
+            <a:r>
+              <a:rPr lang="en-US" sz="2800" dirty="0" err="1"/>
+              <a:t>Pengenalan</a:t>
+            </a:r>
+            <a:r>
+              <a:rPr lang="en-US" sz="2800" dirty="0"/>
+              <a:t> </a:t>
+            </a:r>
+            <a:r>
+              <a:rPr lang="en-US" sz="2800" dirty="0" err="1"/>
+              <a:t>Huruf</a:t>
+            </a:r>
+            <a:r>
+              <a:rPr lang="en-US" sz="2800" dirty="0"/>
+              <a:t> Arab Tunggal </a:t>
+            </a:r>
+            <a:r>
+              <a:rPr lang="en-US" sz="2800" dirty="0" err="1"/>
+              <a:t>dengan</a:t>
+            </a:r>
+            <a:r>
+              <a:rPr lang="en-US" sz="2800" dirty="0"/>
+              <a:t> Font Tahoma,</a:t>
+            </a:r>
+            <a:r>
+              <a:rPr lang="en-US" sz="2800" dirty="0">
+                <a:latin typeface="Calibri" panose="020F0502020204030204" pitchFamily="34" charset="0"/>
+                <a:cs typeface="Calibri" panose="020F0502020204030204" pitchFamily="34" charset="0"/>
+              </a:rPr>
+              <a:t> </a:t>
+            </a:r>
+            <a:r>
+              <a:rPr lang="en-US" sz="2800" dirty="0" err="1">
+                <a:latin typeface="Calibri" panose="020F0502020204030204" pitchFamily="34" charset="0"/>
+                <a:cs typeface="Calibri" panose="020F0502020204030204" pitchFamily="34" charset="0"/>
+              </a:rPr>
+              <a:t>Akurasi</a:t>
+            </a:r>
+            <a:r>
+              <a:rPr lang="en-US" sz="2800" dirty="0">
+                <a:latin typeface="Calibri" panose="020F0502020204030204" pitchFamily="34" charset="0"/>
+                <a:cs typeface="Calibri" panose="020F0502020204030204" pitchFamily="34" charset="0"/>
+              </a:rPr>
+              <a:t> 100%</a:t>
+            </a:r>
+            <a:endParaRPr lang="en-US" sz="2800" dirty="0"/>
+          </a:p>
+        </p:txBody>
+      </p:sp>
+      <p:pic>
+        <p:nvPicPr>
+          <p:cNvPr id="7" name="Content Placeholder 6">
+            <a:extLst>
+              <a:ext uri="{FF2B5EF4-FFF2-40B4-BE49-F238E27FC236}">
+                <a16:creationId xmlns:a16="http://schemas.microsoft.com/office/drawing/2014/main" id="{CC4B09F0-747A-4164-BE9D-45C3A63E20D6}"/>
+              </a:ext>
+            </a:extLst>
+          </p:cNvPr>
+          <p:cNvPicPr>
+            <a:picLocks noGrp="1" noChangeAspect="1"/>
+          </p:cNvPicPr>
+          <p:nvPr>
+            <p:ph idx="1"/>
+          </p:nvPr>
+        </p:nvPicPr>
+        <p:blipFill>
+          <a:blip r:embed="rId2"/>
+          <a:stretch>
+            <a:fillRect/>
+          </a:stretch>
+        </p:blipFill>
+        <p:spPr>
+          <a:xfrm>
+            <a:off x="6652032" y="1288456"/>
+            <a:ext cx="5104692" cy="5160788"/>
+          </a:xfrm>
+        </p:spPr>
+      </p:pic>
+      <p:pic>
+        <p:nvPicPr>
+          <p:cNvPr id="10" name="Picture 9">
+            <a:extLst>
+              <a:ext uri="{FF2B5EF4-FFF2-40B4-BE49-F238E27FC236}">
+                <a16:creationId xmlns:a16="http://schemas.microsoft.com/office/drawing/2014/main" id="{D3E67A35-216F-4609-ACFF-1F55EDB28017}"/>
+              </a:ext>
+            </a:extLst>
+          </p:cNvPr>
+          <p:cNvPicPr>
+            <a:picLocks noChangeAspect="1"/>
+          </p:cNvPicPr>
+          <p:nvPr/>
+        </p:nvPicPr>
+        <p:blipFill>
+          <a:blip r:embed="rId3"/>
+          <a:stretch>
+            <a:fillRect/>
+          </a:stretch>
+        </p:blipFill>
+        <p:spPr>
+          <a:xfrm>
+            <a:off x="683782" y="1288456"/>
+            <a:ext cx="4861612" cy="5160788"/>
+          </a:xfrm>
+          <a:prstGeom prst="rect">
+            <a:avLst/>
+          </a:prstGeom>
+        </p:spPr>
+      </p:pic>
+    </p:spTree>
+    <p:extLst>
+      <p:ext uri="{BB962C8B-B14F-4D97-AF65-F5344CB8AC3E}">
+        <p14:creationId xmlns:p14="http://schemas.microsoft.com/office/powerpoint/2010/main" val="69660154"/>
+      </p:ext>
+    </p:extLst>
+  </p:cSld>
+  <p:clrMapOvr>
+    <a:masterClrMapping/>
+  </p:clrMapOvr>
+</p:sld>
+</file>
+
+<file path=ppt/slides/slide64.xml><?xml version="1.0" encoding="utf-8"?>
+<p:sld xmlns:a="http://schemas.openxmlformats.org/drawingml/2006/main" xmlns:r="http://schemas.openxmlformats.org/officeDocument/2006/relationships" xmlns:p="http://schemas.openxmlformats.org/presentationml/2006/main">
+  <p:cSld>
+    <p:spTree>
+      <p:nvGrpSpPr>
+        <p:cNvPr id="1" name=""/>
+        <p:cNvGrpSpPr/>
+        <p:nvPr/>
+      </p:nvGrpSpPr>
+      <p:grpSpPr>
+        <a:xfrm>
+          <a:off x="0" y="0"/>
+          <a:ext cx="0" cy="0"/>
+          <a:chOff x="0" y="0"/>
+          <a:chExt cx="0" cy="0"/>
+        </a:xfrm>
+      </p:grpSpPr>
+      <p:sp>
+        <p:nvSpPr>
+          <p:cNvPr id="2" name="Title 1">
+            <a:extLst>
+              <a:ext uri="{FF2B5EF4-FFF2-40B4-BE49-F238E27FC236}">
+                <a16:creationId xmlns:a16="http://schemas.microsoft.com/office/drawing/2014/main" id="{50A2B6B5-6DC0-442A-A543-F2324A8445F9}"/>
+              </a:ext>
+            </a:extLst>
+          </p:cNvPr>
+          <p:cNvSpPr>
+            <a:spLocks noGrp="1"/>
+          </p:cNvSpPr>
+          <p:nvPr>
+            <p:ph type="title"/>
+          </p:nvPr>
+        </p:nvSpPr>
+        <p:spPr>
+          <a:xfrm>
+            <a:off x="280219" y="447368"/>
+            <a:ext cx="11533241" cy="555523"/>
+          </a:xfrm>
+        </p:spPr>
+        <p:txBody>
+          <a:bodyPr>
+            <a:noAutofit/>
+          </a:bodyPr>
+          <a:lstStyle/>
+          <a:p>
+            <a:pPr algn="ctr"/>
+            <a:r>
+              <a:rPr lang="en-US" sz="2400" dirty="0" err="1"/>
+              <a:t>Hasil</a:t>
+            </a:r>
+            <a:r>
+              <a:rPr lang="en-US" sz="2400" dirty="0"/>
+              <a:t> </a:t>
+            </a:r>
+            <a:r>
+              <a:rPr lang="en-US" sz="2400" dirty="0" err="1"/>
+              <a:t>Pengenalan</a:t>
+            </a:r>
+            <a:r>
+              <a:rPr lang="en-US" sz="2400" dirty="0"/>
+              <a:t> </a:t>
+            </a:r>
+            <a:r>
+              <a:rPr lang="en-US" sz="2400" dirty="0" err="1"/>
+              <a:t>Huruf</a:t>
+            </a:r>
+            <a:r>
+              <a:rPr lang="en-US" sz="2400" dirty="0"/>
+              <a:t> Arab Tunggal </a:t>
+            </a:r>
+            <a:r>
+              <a:rPr lang="en-US" sz="2400" dirty="0" err="1"/>
+              <a:t>dengan</a:t>
+            </a:r>
+            <a:r>
+              <a:rPr lang="en-US" sz="2400" dirty="0"/>
+              <a:t> Font Times New Roman, </a:t>
+            </a:r>
+            <a:r>
+              <a:rPr lang="en-US" sz="2400" dirty="0" err="1">
+                <a:latin typeface="Calibri" panose="020F0502020204030204" pitchFamily="34" charset="0"/>
+                <a:cs typeface="Calibri" panose="020F0502020204030204" pitchFamily="34" charset="0"/>
+              </a:rPr>
+              <a:t>Akurasi</a:t>
+            </a:r>
+            <a:r>
+              <a:rPr lang="en-US" sz="2400" dirty="0">
+                <a:latin typeface="Calibri" panose="020F0502020204030204" pitchFamily="34" charset="0"/>
+                <a:cs typeface="Calibri" panose="020F0502020204030204" pitchFamily="34" charset="0"/>
+              </a:rPr>
+              <a:t> 100%</a:t>
+            </a:r>
+            <a:endParaRPr lang="en-US" sz="2400" dirty="0"/>
+          </a:p>
+        </p:txBody>
+      </p:sp>
+      <p:pic>
+        <p:nvPicPr>
+          <p:cNvPr id="6" name="Content Placeholder 5">
+            <a:extLst>
+              <a:ext uri="{FF2B5EF4-FFF2-40B4-BE49-F238E27FC236}">
+                <a16:creationId xmlns:a16="http://schemas.microsoft.com/office/drawing/2014/main" id="{427F5FF6-A9D7-422E-94C2-2CE38BD6873A}"/>
+              </a:ext>
+            </a:extLst>
+          </p:cNvPr>
+          <p:cNvPicPr>
+            <a:picLocks noGrp="1" noChangeAspect="1"/>
+          </p:cNvPicPr>
+          <p:nvPr>
+            <p:ph idx="1"/>
+          </p:nvPr>
+        </p:nvPicPr>
+        <p:blipFill>
+          <a:blip r:embed="rId2"/>
+          <a:stretch>
+            <a:fillRect/>
+          </a:stretch>
+        </p:blipFill>
+        <p:spPr>
+          <a:xfrm>
+            <a:off x="929833" y="1368384"/>
+            <a:ext cx="4468076" cy="5058895"/>
+          </a:xfrm>
+        </p:spPr>
+      </p:pic>
+      <p:pic>
+        <p:nvPicPr>
+          <p:cNvPr id="9" name="Picture 8">
+            <a:extLst>
+              <a:ext uri="{FF2B5EF4-FFF2-40B4-BE49-F238E27FC236}">
+                <a16:creationId xmlns:a16="http://schemas.microsoft.com/office/drawing/2014/main" id="{4B09FA3E-995F-465F-8F09-A831A35BA00B}"/>
+              </a:ext>
+            </a:extLst>
+          </p:cNvPr>
+          <p:cNvPicPr>
+            <a:picLocks noChangeAspect="1"/>
+          </p:cNvPicPr>
+          <p:nvPr/>
+        </p:nvPicPr>
+        <p:blipFill>
+          <a:blip r:embed="rId3"/>
+          <a:stretch>
+            <a:fillRect/>
+          </a:stretch>
+        </p:blipFill>
+        <p:spPr>
+          <a:xfrm>
+            <a:off x="6366587" y="1368384"/>
+            <a:ext cx="5260449" cy="4986467"/>
+          </a:xfrm>
+          <a:prstGeom prst="rect">
+            <a:avLst/>
+          </a:prstGeom>
+        </p:spPr>
+      </p:pic>
+    </p:spTree>
+    <p:extLst>
+      <p:ext uri="{BB962C8B-B14F-4D97-AF65-F5344CB8AC3E}">
+        <p14:creationId xmlns:p14="http://schemas.microsoft.com/office/powerpoint/2010/main" val="1218181385"/>
+      </p:ext>
+    </p:extLst>
+  </p:cSld>
+  <p:clrMapOvr>
+    <a:masterClrMapping/>
+  </p:clrMapOvr>
+</p:sld>
+</file>
+
+<file path=ppt/slides/slide65.xml><?xml version="1.0" encoding="utf-8"?>
+<p:sld xmlns:a="http://schemas.openxmlformats.org/drawingml/2006/main" xmlns:r="http://schemas.openxmlformats.org/officeDocument/2006/relationships" xmlns:p="http://schemas.openxmlformats.org/presentationml/2006/main">
+  <p:cSld>
+    <p:spTree>
+      <p:nvGrpSpPr>
+        <p:cNvPr id="1" name=""/>
+        <p:cNvGrpSpPr/>
+        <p:nvPr/>
+      </p:nvGrpSpPr>
+      <p:grpSpPr>
+        <a:xfrm>
+          <a:off x="0" y="0"/>
+          <a:ext cx="0" cy="0"/>
+          <a:chOff x="0" y="0"/>
+          <a:chExt cx="0" cy="0"/>
+        </a:xfrm>
+      </p:grpSpPr>
+      <p:sp>
+        <p:nvSpPr>
+          <p:cNvPr id="2" name="Title 1">
+            <a:extLst>
+              <a:ext uri="{FF2B5EF4-FFF2-40B4-BE49-F238E27FC236}">
+                <a16:creationId xmlns:a16="http://schemas.microsoft.com/office/drawing/2014/main" id="{50A2B6B5-6DC0-442A-A543-F2324A8445F9}"/>
+              </a:ext>
+            </a:extLst>
+          </p:cNvPr>
+          <p:cNvSpPr>
+            <a:spLocks noGrp="1"/>
+          </p:cNvSpPr>
+          <p:nvPr>
+            <p:ph type="title"/>
+          </p:nvPr>
+        </p:nvSpPr>
+        <p:spPr>
+          <a:xfrm>
+            <a:off x="324465" y="447368"/>
+            <a:ext cx="11463316" cy="555523"/>
+          </a:xfrm>
+        </p:spPr>
+        <p:txBody>
+          <a:bodyPr>
+            <a:noAutofit/>
+          </a:bodyPr>
+          <a:lstStyle/>
+          <a:p>
+            <a:pPr algn="ctr"/>
+            <a:r>
+              <a:rPr lang="en-US" sz="2800" dirty="0" err="1"/>
+              <a:t>Hasil</a:t>
+            </a:r>
+            <a:r>
+              <a:rPr lang="en-US" sz="2800" dirty="0"/>
+              <a:t> </a:t>
+            </a:r>
+            <a:r>
+              <a:rPr lang="en-US" sz="2800" dirty="0" err="1"/>
+              <a:t>Pengenalan</a:t>
+            </a:r>
+            <a:r>
+              <a:rPr lang="en-US" sz="2800" dirty="0"/>
+              <a:t> </a:t>
+            </a:r>
+            <a:r>
+              <a:rPr lang="en-US" sz="2800" dirty="0" err="1"/>
+              <a:t>Huruf</a:t>
+            </a:r>
+            <a:r>
+              <a:rPr lang="en-US" sz="2800" dirty="0"/>
+              <a:t> Arab Tunggal </a:t>
+            </a:r>
+            <a:r>
+              <a:rPr lang="en-US" sz="2800" dirty="0" err="1"/>
+              <a:t>dengan</a:t>
+            </a:r>
+            <a:r>
+              <a:rPr lang="en-US" sz="2800" dirty="0"/>
+              <a:t> Font Segoe UI, </a:t>
+            </a:r>
+            <a:r>
+              <a:rPr lang="en-US" sz="2800" dirty="0" err="1">
+                <a:latin typeface="Calibri" panose="020F0502020204030204" pitchFamily="34" charset="0"/>
+                <a:cs typeface="Calibri" panose="020F0502020204030204" pitchFamily="34" charset="0"/>
+              </a:rPr>
+              <a:t>Akurasi</a:t>
+            </a:r>
+            <a:r>
+              <a:rPr lang="en-US" sz="2800" dirty="0">
+                <a:latin typeface="Calibri" panose="020F0502020204030204" pitchFamily="34" charset="0"/>
+                <a:cs typeface="Calibri" panose="020F0502020204030204" pitchFamily="34" charset="0"/>
+              </a:rPr>
+              <a:t> 51%</a:t>
+            </a:r>
+            <a:endParaRPr lang="en-US" sz="2800" dirty="0"/>
+          </a:p>
+        </p:txBody>
+      </p:sp>
+      <p:pic>
+        <p:nvPicPr>
+          <p:cNvPr id="18" name="Content Placeholder 17">
+            <a:extLst>
+              <a:ext uri="{FF2B5EF4-FFF2-40B4-BE49-F238E27FC236}">
+                <a16:creationId xmlns:a16="http://schemas.microsoft.com/office/drawing/2014/main" id="{A9ECA3CC-10E4-4DFE-AC70-718C5DEA74ED}"/>
+              </a:ext>
+            </a:extLst>
+          </p:cNvPr>
+          <p:cNvPicPr>
+            <a:picLocks noGrp="1" noChangeAspect="1"/>
+          </p:cNvPicPr>
+          <p:nvPr>
+            <p:ph idx="1"/>
+          </p:nvPr>
+        </p:nvPicPr>
+        <p:blipFill>
+          <a:blip r:embed="rId2"/>
+          <a:stretch>
+            <a:fillRect/>
+          </a:stretch>
+        </p:blipFill>
+        <p:spPr>
+          <a:xfrm>
+            <a:off x="746823" y="1366190"/>
+            <a:ext cx="5476997" cy="5092325"/>
+          </a:xfrm>
+        </p:spPr>
+      </p:pic>
+      <p:pic>
+        <p:nvPicPr>
+          <p:cNvPr id="20" name="Picture 19">
+            <a:extLst>
+              <a:ext uri="{FF2B5EF4-FFF2-40B4-BE49-F238E27FC236}">
+                <a16:creationId xmlns:a16="http://schemas.microsoft.com/office/drawing/2014/main" id="{09A4CF15-CDC0-4FCA-8897-7AC52D9869C5}"/>
+              </a:ext>
+            </a:extLst>
+          </p:cNvPr>
+          <p:cNvPicPr>
+            <a:picLocks noChangeAspect="1"/>
+          </p:cNvPicPr>
+          <p:nvPr/>
+        </p:nvPicPr>
+        <p:blipFill>
+          <a:blip r:embed="rId3"/>
+          <a:stretch>
+            <a:fillRect/>
+          </a:stretch>
+        </p:blipFill>
+        <p:spPr>
+          <a:xfrm>
+            <a:off x="5593925" y="1366190"/>
+            <a:ext cx="6193856" cy="5092325"/>
           </a:xfrm>
           <a:prstGeom prst="rect">
             <a:avLst/>
@@ -27798,6 +28400,1280 @@
     <p:extLst>
       <p:ext uri="{BB962C8B-B14F-4D97-AF65-F5344CB8AC3E}">
         <p14:creationId xmlns:p14="http://schemas.microsoft.com/office/powerpoint/2010/main" val="3350705638"/>
+      </p:ext>
+    </p:extLst>
+  </p:cSld>
+  <p:clrMapOvr>
+    <a:masterClrMapping/>
+  </p:clrMapOvr>
+</p:sld>
+</file>
+
+<file path=ppt/slides/slide66.xml><?xml version="1.0" encoding="utf-8"?>
+<p:sld xmlns:a="http://schemas.openxmlformats.org/drawingml/2006/main" xmlns:r="http://schemas.openxmlformats.org/officeDocument/2006/relationships" xmlns:p="http://schemas.openxmlformats.org/presentationml/2006/main">
+  <p:cSld>
+    <p:spTree>
+      <p:nvGrpSpPr>
+        <p:cNvPr id="1" name=""/>
+        <p:cNvGrpSpPr/>
+        <p:nvPr/>
+      </p:nvGrpSpPr>
+      <p:grpSpPr>
+        <a:xfrm>
+          <a:off x="0" y="0"/>
+          <a:ext cx="0" cy="0"/>
+          <a:chOff x="0" y="0"/>
+          <a:chExt cx="0" cy="0"/>
+        </a:xfrm>
+      </p:grpSpPr>
+      <p:sp>
+        <p:nvSpPr>
+          <p:cNvPr id="2" name="Title 1">
+            <a:extLst>
+              <a:ext uri="{FF2B5EF4-FFF2-40B4-BE49-F238E27FC236}">
+                <a16:creationId xmlns:a16="http://schemas.microsoft.com/office/drawing/2014/main" id="{B906CA40-AAC3-4DC0-9255-2AF368B04AD9}"/>
+              </a:ext>
+            </a:extLst>
+          </p:cNvPr>
+          <p:cNvSpPr>
+            <a:spLocks noGrp="1"/>
+          </p:cNvSpPr>
+          <p:nvPr>
+            <p:ph type="title"/>
+          </p:nvPr>
+        </p:nvSpPr>
+        <p:spPr>
+          <a:xfrm>
+            <a:off x="1140351" y="226597"/>
+            <a:ext cx="9875520" cy="662731"/>
+          </a:xfrm>
+        </p:spPr>
+        <p:txBody>
+          <a:bodyPr>
+            <a:normAutofit/>
+          </a:bodyPr>
+          <a:lstStyle/>
+          <a:p>
+            <a:pPr algn="ctr"/>
+            <a:r>
+              <a:rPr lang="en-US" sz="2800" dirty="0">
+                <a:latin typeface="Calibri" panose="020F0502020204030204" pitchFamily="34" charset="0"/>
+                <a:cs typeface="Calibri" panose="020F0502020204030204" pitchFamily="34" charset="0"/>
+              </a:rPr>
+              <a:t>Analisa </a:t>
+            </a:r>
+            <a:r>
+              <a:rPr lang="en-US" sz="2800" dirty="0" err="1">
+                <a:latin typeface="Calibri" panose="020F0502020204030204" pitchFamily="34" charset="0"/>
+                <a:cs typeface="Calibri" panose="020F0502020204030204" pitchFamily="34" charset="0"/>
+              </a:rPr>
+              <a:t>Pengenalan</a:t>
+            </a:r>
+            <a:r>
+              <a:rPr lang="en-US" sz="2800" dirty="0">
+                <a:latin typeface="Calibri" panose="020F0502020204030204" pitchFamily="34" charset="0"/>
+                <a:cs typeface="Calibri" panose="020F0502020204030204" pitchFamily="34" charset="0"/>
+              </a:rPr>
+              <a:t> </a:t>
+            </a:r>
+            <a:r>
+              <a:rPr lang="en-US" sz="2800" dirty="0" err="1">
+                <a:latin typeface="Calibri" panose="020F0502020204030204" pitchFamily="34" charset="0"/>
+                <a:cs typeface="Calibri" panose="020F0502020204030204" pitchFamily="34" charset="0"/>
+              </a:rPr>
+              <a:t>Huruf</a:t>
+            </a:r>
+            <a:r>
+              <a:rPr lang="en-US" sz="2800" dirty="0">
+                <a:latin typeface="Calibri" panose="020F0502020204030204" pitchFamily="34" charset="0"/>
+                <a:cs typeface="Calibri" panose="020F0502020204030204" pitchFamily="34" charset="0"/>
+              </a:rPr>
+              <a:t> yang Salah </a:t>
+            </a:r>
+            <a:r>
+              <a:rPr lang="en-US" sz="2800" dirty="0" err="1">
+                <a:latin typeface="Calibri" panose="020F0502020204030204" pitchFamily="34" charset="0"/>
+                <a:cs typeface="Calibri" panose="020F0502020204030204" pitchFamily="34" charset="0"/>
+              </a:rPr>
+              <a:t>dengan</a:t>
+            </a:r>
+            <a:r>
+              <a:rPr lang="en-US" sz="2800" dirty="0">
+                <a:latin typeface="Calibri" panose="020F0502020204030204" pitchFamily="34" charset="0"/>
+                <a:cs typeface="Calibri" panose="020F0502020204030204" pitchFamily="34" charset="0"/>
+              </a:rPr>
+              <a:t> Font Segoe UI</a:t>
+            </a:r>
+          </a:p>
+        </p:txBody>
+      </p:sp>
+      <p:sp>
+        <p:nvSpPr>
+          <p:cNvPr id="3" name="Content Placeholder 2">
+            <a:extLst>
+              <a:ext uri="{FF2B5EF4-FFF2-40B4-BE49-F238E27FC236}">
+                <a16:creationId xmlns:a16="http://schemas.microsoft.com/office/drawing/2014/main" id="{F3D2BC5A-4946-41D4-AB2D-6574424F3ACD}"/>
+              </a:ext>
+            </a:extLst>
+          </p:cNvPr>
+          <p:cNvSpPr>
+            <a:spLocks noGrp="1"/>
+          </p:cNvSpPr>
+          <p:nvPr>
+            <p:ph idx="1"/>
+          </p:nvPr>
+        </p:nvSpPr>
+        <p:spPr>
+          <a:xfrm>
+            <a:off x="5729747" y="1214282"/>
+            <a:ext cx="5670755" cy="5456903"/>
+          </a:xfrm>
+        </p:spPr>
+        <p:txBody>
+          <a:bodyPr>
+            <a:normAutofit/>
+          </a:bodyPr>
+          <a:lstStyle/>
+          <a:p>
+            <a:pPr marL="45720" indent="0">
+              <a:buNone/>
+            </a:pPr>
+            <a:r>
+              <a:rPr lang="en-US" sz="1800" dirty="0" err="1">
+                <a:latin typeface="Calibri" panose="020F0502020204030204" pitchFamily="34" charset="0"/>
+                <a:cs typeface="Calibri" panose="020F0502020204030204" pitchFamily="34" charset="0"/>
+              </a:rPr>
+              <a:t>tahoma_tho_diakhir</a:t>
+            </a:r>
+            <a:r>
+              <a:rPr lang="en-US" sz="1800" dirty="0">
+                <a:latin typeface="Calibri" panose="020F0502020204030204" pitchFamily="34" charset="0"/>
+                <a:cs typeface="Calibri" panose="020F0502020204030204" pitchFamily="34" charset="0"/>
+              </a:rPr>
+              <a:t> : [ 6, 6, 3, 6, 8, 8, 6, 4, 1, 8 ]</a:t>
+            </a:r>
+          </a:p>
+          <a:p>
+            <a:pPr marL="45720" indent="0">
+              <a:buNone/>
+            </a:pPr>
+            <a:r>
+              <a:rPr lang="en-US" sz="1800" dirty="0" err="1">
+                <a:latin typeface="Calibri" panose="020F0502020204030204" pitchFamily="34" charset="0"/>
+                <a:cs typeface="Calibri" panose="020F0502020204030204" pitchFamily="34" charset="0"/>
+              </a:rPr>
+              <a:t>tahoma_tho_diawal</a:t>
+            </a:r>
+            <a:r>
+              <a:rPr lang="en-US" sz="1800" dirty="0">
+                <a:latin typeface="Calibri" panose="020F0502020204030204" pitchFamily="34" charset="0"/>
+                <a:cs typeface="Calibri" panose="020F0502020204030204" pitchFamily="34" charset="0"/>
+              </a:rPr>
+              <a:t> : [ 6, 6, 4, 5, 8, 2, 6, 4, 1, 8 ]</a:t>
+            </a:r>
+          </a:p>
+          <a:p>
+            <a:pPr marL="45720" indent="0">
+              <a:buNone/>
+            </a:pPr>
+            <a:r>
+              <a:rPr lang="en-US" sz="1800" dirty="0" err="1">
+                <a:latin typeface="Calibri" panose="020F0502020204030204" pitchFamily="34" charset="0"/>
+                <a:cs typeface="Calibri" panose="020F0502020204030204" pitchFamily="34" charset="0"/>
+              </a:rPr>
+              <a:t>tahoma_tho_ditengah</a:t>
+            </a:r>
+            <a:r>
+              <a:rPr lang="en-US" sz="1800" dirty="0">
+                <a:latin typeface="Calibri" panose="020F0502020204030204" pitchFamily="34" charset="0"/>
+                <a:cs typeface="Calibri" panose="020F0502020204030204" pitchFamily="34" charset="0"/>
+              </a:rPr>
+              <a:t> : [ 6, 6, 3, 6, 8, 2, 4, 4, 2, 8 ]</a:t>
+            </a:r>
+          </a:p>
+          <a:p>
+            <a:pPr marL="45720" indent="0">
+              <a:buNone/>
+            </a:pPr>
+            <a:r>
+              <a:rPr lang="en-US" sz="1800" dirty="0" err="1">
+                <a:latin typeface="Calibri" panose="020F0502020204030204" pitchFamily="34" charset="0"/>
+                <a:cs typeface="Calibri" panose="020F0502020204030204" pitchFamily="34" charset="0"/>
+              </a:rPr>
+              <a:t>tahoma_tho_terpisah</a:t>
+            </a:r>
+            <a:r>
+              <a:rPr lang="en-US" sz="1800" dirty="0">
+                <a:latin typeface="Calibri" panose="020F0502020204030204" pitchFamily="34" charset="0"/>
+                <a:cs typeface="Calibri" panose="020F0502020204030204" pitchFamily="34" charset="0"/>
+              </a:rPr>
+              <a:t> : [ 6, 6, 3, 6, 8, 8, 6, 4, 1, 8 ]</a:t>
+            </a:r>
+          </a:p>
+          <a:p>
+            <a:pPr marL="45720" indent="0">
+              <a:buNone/>
+            </a:pPr>
+            <a:endParaRPr lang="en-US" sz="1800" dirty="0">
+              <a:latin typeface="Calibri" panose="020F0502020204030204" pitchFamily="34" charset="0"/>
+              <a:cs typeface="Calibri" panose="020F0502020204030204" pitchFamily="34" charset="0"/>
+            </a:endParaRPr>
+          </a:p>
+          <a:p>
+            <a:pPr marL="45720" indent="0">
+              <a:buNone/>
+            </a:pPr>
+            <a:r>
+              <a:rPr lang="en-US" sz="1800" dirty="0" err="1">
+                <a:latin typeface="Calibri" panose="020F0502020204030204" pitchFamily="34" charset="0"/>
+                <a:cs typeface="Calibri" panose="020F0502020204030204" pitchFamily="34" charset="0"/>
+              </a:rPr>
+              <a:t>timesnewroman_tho_diakhir</a:t>
+            </a:r>
+            <a:r>
+              <a:rPr lang="en-US" sz="1800" dirty="0">
+                <a:latin typeface="Calibri" panose="020F0502020204030204" pitchFamily="34" charset="0"/>
+                <a:cs typeface="Calibri" panose="020F0502020204030204" pitchFamily="34" charset="0"/>
+              </a:rPr>
+              <a:t> : [ 6, 6, 4, 8, 8, 8, 7, 4, 2, 8 ]</a:t>
+            </a:r>
+          </a:p>
+          <a:p>
+            <a:pPr marL="45720" indent="0">
+              <a:buNone/>
+            </a:pPr>
+            <a:r>
+              <a:rPr lang="en-US" sz="1800" dirty="0" err="1">
+                <a:latin typeface="Calibri" panose="020F0502020204030204" pitchFamily="34" charset="0"/>
+                <a:cs typeface="Calibri" panose="020F0502020204030204" pitchFamily="34" charset="0"/>
+              </a:rPr>
+              <a:t>timesnewroman_tho_diawal</a:t>
+            </a:r>
+            <a:r>
+              <a:rPr lang="en-US" sz="1800" dirty="0">
+                <a:latin typeface="Calibri" panose="020F0502020204030204" pitchFamily="34" charset="0"/>
+                <a:cs typeface="Calibri" panose="020F0502020204030204" pitchFamily="34" charset="0"/>
+              </a:rPr>
+              <a:t> : [ 6, 6, 4, 6, 8, 8, 4, 4, 1, 8 ]</a:t>
+            </a:r>
+          </a:p>
+          <a:p>
+            <a:pPr marL="45720" indent="0">
+              <a:buNone/>
+            </a:pPr>
+            <a:r>
+              <a:rPr lang="en-US" sz="1800" dirty="0" err="1">
+                <a:latin typeface="Calibri" panose="020F0502020204030204" pitchFamily="34" charset="0"/>
+                <a:cs typeface="Calibri" panose="020F0502020204030204" pitchFamily="34" charset="0"/>
+              </a:rPr>
+              <a:t>timesnewroman_tho_ditengah</a:t>
+            </a:r>
+            <a:r>
+              <a:rPr lang="en-US" sz="1800" dirty="0">
+                <a:latin typeface="Calibri" panose="020F0502020204030204" pitchFamily="34" charset="0"/>
+                <a:cs typeface="Calibri" panose="020F0502020204030204" pitchFamily="34" charset="0"/>
+              </a:rPr>
+              <a:t> : [ 6, 6, 4, 6, 8, 8, 4, 4, 1, 8 ]</a:t>
+            </a:r>
+          </a:p>
+          <a:p>
+            <a:pPr marL="45720" indent="0">
+              <a:buNone/>
+            </a:pPr>
+            <a:r>
+              <a:rPr lang="en-US" sz="1800" dirty="0" err="1">
+                <a:latin typeface="Calibri" panose="020F0502020204030204" pitchFamily="34" charset="0"/>
+                <a:cs typeface="Calibri" panose="020F0502020204030204" pitchFamily="34" charset="0"/>
+              </a:rPr>
+              <a:t>timesnewroman_tho_terpisah</a:t>
+            </a:r>
+            <a:r>
+              <a:rPr lang="en-US" sz="1800" dirty="0">
+                <a:latin typeface="Calibri" panose="020F0502020204030204" pitchFamily="34" charset="0"/>
+                <a:cs typeface="Calibri" panose="020F0502020204030204" pitchFamily="34" charset="0"/>
+              </a:rPr>
+              <a:t> : [ 6, 6, 4, 8, 8, 8, 7, 4, 2, 8 ]</a:t>
+            </a:r>
+          </a:p>
+        </p:txBody>
+      </p:sp>
+      <p:sp>
+        <p:nvSpPr>
+          <p:cNvPr id="5" name="Content Placeholder 2">
+            <a:extLst>
+              <a:ext uri="{FF2B5EF4-FFF2-40B4-BE49-F238E27FC236}">
+                <a16:creationId xmlns:a16="http://schemas.microsoft.com/office/drawing/2014/main" id="{3389628A-59D2-4F60-A87E-1FDF76B24A51}"/>
+              </a:ext>
+            </a:extLst>
+          </p:cNvPr>
+          <p:cNvSpPr txBox="1">
+            <a:spLocks/>
+          </p:cNvSpPr>
+          <p:nvPr/>
+        </p:nvSpPr>
+        <p:spPr>
+          <a:xfrm>
+            <a:off x="557980" y="1170038"/>
+            <a:ext cx="4844846" cy="5456903"/>
+          </a:xfrm>
+          <a:prstGeom prst="rect">
+            <a:avLst/>
+          </a:prstGeom>
+        </p:spPr>
+        <p:txBody>
+          <a:bodyPr vert="horz" lIns="91440" tIns="45720" rIns="91440" bIns="45720" rtlCol="0">
+            <a:normAutofit/>
+          </a:bodyPr>
+          <a:lstStyle>
+            <a:lvl1pPr marL="228600" indent="-182880" algn="l" defTabSz="914400" rtl="0" eaLnBrk="1" latinLnBrk="0" hangingPunct="1">
+              <a:lnSpc>
+                <a:spcPct val="90000"/>
+              </a:lnSpc>
+              <a:spcBef>
+                <a:spcPts val="1400"/>
+              </a:spcBef>
+              <a:buClr>
+                <a:schemeClr val="tx1"/>
+              </a:buClr>
+              <a:buSzPct val="80000"/>
+              <a:buFont typeface="Corbel" pitchFamily="34" charset="0"/>
+              <a:buChar char="•"/>
+              <a:defRPr sz="2200" kern="1200">
+                <a:solidFill>
+                  <a:schemeClr val="tx1"/>
+                </a:solidFill>
+                <a:latin typeface="+mn-lt"/>
+                <a:ea typeface="+mn-ea"/>
+                <a:cs typeface="+mn-cs"/>
+              </a:defRPr>
+            </a:lvl1pPr>
+            <a:lvl2pPr marL="457200" indent="-182880" algn="l" defTabSz="914400" rtl="0" eaLnBrk="1" latinLnBrk="0" hangingPunct="1">
+              <a:lnSpc>
+                <a:spcPct val="90000"/>
+              </a:lnSpc>
+              <a:spcBef>
+                <a:spcPts val="200"/>
+              </a:spcBef>
+              <a:spcAft>
+                <a:spcPts val="400"/>
+              </a:spcAft>
+              <a:buClr>
+                <a:schemeClr val="tx1"/>
+              </a:buClr>
+              <a:buSzPct val="80000"/>
+              <a:buFont typeface="Corbel" pitchFamily="34" charset="0"/>
+              <a:buChar char="•"/>
+              <a:defRPr sz="2000" kern="1200">
+                <a:solidFill>
+                  <a:schemeClr val="tx1"/>
+                </a:solidFill>
+                <a:latin typeface="+mn-lt"/>
+                <a:ea typeface="+mn-ea"/>
+                <a:cs typeface="+mn-cs"/>
+              </a:defRPr>
+            </a:lvl2pPr>
+            <a:lvl3pPr marL="731520" indent="-182880" algn="l" defTabSz="914400" rtl="0" eaLnBrk="1" latinLnBrk="0" hangingPunct="1">
+              <a:lnSpc>
+                <a:spcPct val="90000"/>
+              </a:lnSpc>
+              <a:spcBef>
+                <a:spcPts val="200"/>
+              </a:spcBef>
+              <a:spcAft>
+                <a:spcPts val="400"/>
+              </a:spcAft>
+              <a:buClr>
+                <a:schemeClr val="tx1"/>
+              </a:buClr>
+              <a:buSzPct val="80000"/>
+              <a:buFont typeface="Corbel" pitchFamily="34" charset="0"/>
+              <a:buChar char="•"/>
+              <a:defRPr sz="1800" kern="1200">
+                <a:solidFill>
+                  <a:schemeClr val="tx1"/>
+                </a:solidFill>
+                <a:latin typeface="+mn-lt"/>
+                <a:ea typeface="+mn-ea"/>
+                <a:cs typeface="+mn-cs"/>
+              </a:defRPr>
+            </a:lvl3pPr>
+            <a:lvl4pPr marL="1005840" indent="-182880" algn="l" defTabSz="914400" rtl="0" eaLnBrk="1" latinLnBrk="0" hangingPunct="1">
+              <a:lnSpc>
+                <a:spcPct val="90000"/>
+              </a:lnSpc>
+              <a:spcBef>
+                <a:spcPts val="200"/>
+              </a:spcBef>
+              <a:spcAft>
+                <a:spcPts val="400"/>
+              </a:spcAft>
+              <a:buClr>
+                <a:schemeClr val="tx1"/>
+              </a:buClr>
+              <a:buSzPct val="80000"/>
+              <a:buFont typeface="Corbel" pitchFamily="34" charset="0"/>
+              <a:buChar char="•"/>
+              <a:defRPr sz="1600" kern="1200">
+                <a:solidFill>
+                  <a:schemeClr val="tx1"/>
+                </a:solidFill>
+                <a:latin typeface="+mn-lt"/>
+                <a:ea typeface="+mn-ea"/>
+                <a:cs typeface="+mn-cs"/>
+              </a:defRPr>
+            </a:lvl4pPr>
+            <a:lvl5pPr marL="1280160" indent="-182880" algn="l" defTabSz="914400" rtl="0" eaLnBrk="1" latinLnBrk="0" hangingPunct="1">
+              <a:lnSpc>
+                <a:spcPct val="90000"/>
+              </a:lnSpc>
+              <a:spcBef>
+                <a:spcPts val="200"/>
+              </a:spcBef>
+              <a:spcAft>
+                <a:spcPts val="400"/>
+              </a:spcAft>
+              <a:buClr>
+                <a:schemeClr val="tx1"/>
+              </a:buClr>
+              <a:buSzPct val="80000"/>
+              <a:buFont typeface="Corbel" pitchFamily="34" charset="0"/>
+              <a:buChar char="•"/>
+              <a:defRPr sz="1600" kern="1200">
+                <a:solidFill>
+                  <a:schemeClr val="tx1"/>
+                </a:solidFill>
+                <a:latin typeface="+mn-lt"/>
+                <a:ea typeface="+mn-ea"/>
+                <a:cs typeface="+mn-cs"/>
+              </a:defRPr>
+            </a:lvl5pPr>
+            <a:lvl6pPr marL="1600000" indent="-228600" algn="l" defTabSz="914400" rtl="0" eaLnBrk="1" latinLnBrk="0" hangingPunct="1">
+              <a:lnSpc>
+                <a:spcPct val="90000"/>
+              </a:lnSpc>
+              <a:spcBef>
+                <a:spcPts val="200"/>
+              </a:spcBef>
+              <a:spcAft>
+                <a:spcPts val="400"/>
+              </a:spcAft>
+              <a:buClr>
+                <a:schemeClr val="tx1"/>
+              </a:buClr>
+              <a:buSzPct val="80000"/>
+              <a:buFont typeface="Corbel" pitchFamily="34" charset="0"/>
+              <a:buChar char="•"/>
+              <a:defRPr sz="1600" kern="1200">
+                <a:solidFill>
+                  <a:schemeClr val="tx1"/>
+                </a:solidFill>
+                <a:latin typeface="+mn-lt"/>
+                <a:ea typeface="+mn-ea"/>
+                <a:cs typeface="+mn-cs"/>
+              </a:defRPr>
+            </a:lvl6pPr>
+            <a:lvl7pPr marL="1900000" indent="-228600" algn="l" defTabSz="914400" rtl="0" eaLnBrk="1" latinLnBrk="0" hangingPunct="1">
+              <a:lnSpc>
+                <a:spcPct val="90000"/>
+              </a:lnSpc>
+              <a:spcBef>
+                <a:spcPts val="200"/>
+              </a:spcBef>
+              <a:spcAft>
+                <a:spcPts val="400"/>
+              </a:spcAft>
+              <a:buClr>
+                <a:schemeClr val="tx1"/>
+              </a:buClr>
+              <a:buSzPct val="80000"/>
+              <a:buFont typeface="Corbel" pitchFamily="34" charset="0"/>
+              <a:buChar char="•"/>
+              <a:defRPr sz="1600" kern="1200">
+                <a:solidFill>
+                  <a:schemeClr val="tx1"/>
+                </a:solidFill>
+                <a:latin typeface="+mn-lt"/>
+                <a:ea typeface="+mn-ea"/>
+                <a:cs typeface="+mn-cs"/>
+              </a:defRPr>
+            </a:lvl7pPr>
+            <a:lvl8pPr marL="2200000" indent="-228600" algn="l" defTabSz="914400" rtl="0" eaLnBrk="1" latinLnBrk="0" hangingPunct="1">
+              <a:lnSpc>
+                <a:spcPct val="90000"/>
+              </a:lnSpc>
+              <a:spcBef>
+                <a:spcPts val="200"/>
+              </a:spcBef>
+              <a:spcAft>
+                <a:spcPts val="400"/>
+              </a:spcAft>
+              <a:buClr>
+                <a:schemeClr val="tx1"/>
+              </a:buClr>
+              <a:buSzPct val="80000"/>
+              <a:buFont typeface="Corbel" pitchFamily="34" charset="0"/>
+              <a:buChar char="•"/>
+              <a:defRPr sz="1600" kern="1200">
+                <a:solidFill>
+                  <a:schemeClr val="tx1"/>
+                </a:solidFill>
+                <a:latin typeface="+mn-lt"/>
+                <a:ea typeface="+mn-ea"/>
+                <a:cs typeface="+mn-cs"/>
+              </a:defRPr>
+            </a:lvl8pPr>
+            <a:lvl9pPr marL="2500000" indent="-228600" algn="l" defTabSz="914400" rtl="0" eaLnBrk="1" latinLnBrk="0" hangingPunct="1">
+              <a:lnSpc>
+                <a:spcPct val="90000"/>
+              </a:lnSpc>
+              <a:spcBef>
+                <a:spcPts val="200"/>
+              </a:spcBef>
+              <a:spcAft>
+                <a:spcPts val="400"/>
+              </a:spcAft>
+              <a:buClr>
+                <a:schemeClr val="tx1"/>
+              </a:buClr>
+              <a:buSzPct val="80000"/>
+              <a:buFont typeface="Corbel" pitchFamily="34" charset="0"/>
+              <a:buChar char="•"/>
+              <a:defRPr sz="1600" kern="1200">
+                <a:solidFill>
+                  <a:schemeClr val="tx1"/>
+                </a:solidFill>
+                <a:latin typeface="+mn-lt"/>
+                <a:ea typeface="+mn-ea"/>
+                <a:cs typeface="+mn-cs"/>
+              </a:defRPr>
+            </a:lvl9pPr>
+          </a:lstStyle>
+          <a:p>
+            <a:r>
+              <a:rPr lang="en-US" sz="1800" dirty="0">
+                <a:latin typeface="Calibri" panose="020F0502020204030204" pitchFamily="34" charset="0"/>
+                <a:cs typeface="Calibri" panose="020F0502020204030204" pitchFamily="34" charset="0"/>
+              </a:rPr>
+              <a:t>Data test :</a:t>
+            </a:r>
+          </a:p>
+          <a:p>
+            <a:pPr marL="45720" indent="0">
+              <a:buFont typeface="Corbel" pitchFamily="34" charset="0"/>
+              <a:buNone/>
+            </a:pPr>
+            <a:r>
+              <a:rPr lang="en-US" sz="1800" dirty="0">
+                <a:latin typeface="Calibri" panose="020F0502020204030204" pitchFamily="34" charset="0"/>
+                <a:cs typeface="Calibri" panose="020F0502020204030204" pitchFamily="34" charset="0"/>
+              </a:rPr>
+              <a:t>Ain : [ 8, 6, 5, 4, 8, 7, 6, 4, 4, 4 ],</a:t>
+            </a:r>
+          </a:p>
+          <a:p>
+            <a:r>
+              <a:rPr lang="en-US" sz="1800" dirty="0">
+                <a:latin typeface="Calibri" panose="020F0502020204030204" pitchFamily="34" charset="0"/>
+                <a:cs typeface="Calibri" panose="020F0502020204030204" pitchFamily="34" charset="0"/>
+              </a:rPr>
+              <a:t>Data Training :</a:t>
+            </a:r>
+          </a:p>
+          <a:p>
+            <a:pPr marL="45720" indent="0">
+              <a:buFont typeface="Corbel" pitchFamily="34" charset="0"/>
+              <a:buNone/>
+            </a:pPr>
+            <a:r>
+              <a:rPr lang="en-US" sz="1800" dirty="0" err="1">
+                <a:latin typeface="Calibri" panose="020F0502020204030204" pitchFamily="34" charset="0"/>
+                <a:cs typeface="Calibri" panose="020F0502020204030204" pitchFamily="34" charset="0"/>
+              </a:rPr>
+              <a:t>arial_ain_terpisah</a:t>
+            </a:r>
+            <a:r>
+              <a:rPr lang="en-US" sz="1800" dirty="0">
+                <a:latin typeface="Calibri" panose="020F0502020204030204" pitchFamily="34" charset="0"/>
+                <a:cs typeface="Calibri" panose="020F0502020204030204" pitchFamily="34" charset="0"/>
+              </a:rPr>
+              <a:t> : [ 1, 8, 6, 5, 4, 8, 6, 6, 4, 4 ]</a:t>
+            </a:r>
+          </a:p>
+          <a:p>
+            <a:pPr marL="45720" indent="0">
+              <a:buFont typeface="Corbel" pitchFamily="34" charset="0"/>
+              <a:buNone/>
+            </a:pPr>
+            <a:r>
+              <a:rPr lang="en-US" sz="1800" dirty="0" err="1">
+                <a:latin typeface="Calibri" panose="020F0502020204030204" pitchFamily="34" charset="0"/>
+                <a:cs typeface="Calibri" panose="020F0502020204030204" pitchFamily="34" charset="0"/>
+              </a:rPr>
+              <a:t>tahoma_ain_terpisah</a:t>
+            </a:r>
+            <a:r>
+              <a:rPr lang="en-US" sz="1800" dirty="0">
+                <a:latin typeface="Calibri" panose="020F0502020204030204" pitchFamily="34" charset="0"/>
+                <a:cs typeface="Calibri" panose="020F0502020204030204" pitchFamily="34" charset="0"/>
+              </a:rPr>
+              <a:t> : [ 8, 7, 6, 4, 8, 7, 6, 4, 4, 2 ]</a:t>
+            </a:r>
+          </a:p>
+          <a:p>
+            <a:pPr marL="45720" indent="0">
+              <a:buNone/>
+            </a:pPr>
+            <a:r>
+              <a:rPr lang="en-US" sz="1800" dirty="0" err="1">
+                <a:latin typeface="Calibri" panose="020F0502020204030204" pitchFamily="34" charset="0"/>
+                <a:cs typeface="Calibri" panose="020F0502020204030204" pitchFamily="34" charset="0"/>
+              </a:rPr>
+              <a:t>timesnr_ain_terpisah</a:t>
+            </a:r>
+            <a:r>
+              <a:rPr lang="en-US" sz="1800" dirty="0">
+                <a:latin typeface="Calibri" panose="020F0502020204030204" pitchFamily="34" charset="0"/>
+                <a:cs typeface="Calibri" panose="020F0502020204030204" pitchFamily="34" charset="0"/>
+              </a:rPr>
+              <a:t> : [ 8, 5, 3, 6, 4, 4, 8, 1, 3, 8 ]</a:t>
+            </a:r>
+          </a:p>
+          <a:p>
+            <a:pPr marL="45720" indent="0">
+              <a:buNone/>
+            </a:pPr>
+            <a:endParaRPr lang="en-US" sz="1800" dirty="0">
+              <a:latin typeface="Calibri" panose="020F0502020204030204" pitchFamily="34" charset="0"/>
+              <a:cs typeface="Calibri" panose="020F0502020204030204" pitchFamily="34" charset="0"/>
+            </a:endParaRPr>
+          </a:p>
+          <a:p>
+            <a:pPr marL="45720" indent="0">
+              <a:buNone/>
+            </a:pPr>
+            <a:r>
+              <a:rPr lang="en-US" sz="1800" dirty="0" err="1">
+                <a:latin typeface="Calibri" panose="020F0502020204030204" pitchFamily="34" charset="0"/>
+                <a:cs typeface="Calibri" panose="020F0502020204030204" pitchFamily="34" charset="0"/>
+              </a:rPr>
+              <a:t>arial_tho_diakhir</a:t>
+            </a:r>
+            <a:r>
+              <a:rPr lang="en-US" sz="1800" dirty="0">
+                <a:latin typeface="Calibri" panose="020F0502020204030204" pitchFamily="34" charset="0"/>
+                <a:cs typeface="Calibri" panose="020F0502020204030204" pitchFamily="34" charset="0"/>
+              </a:rPr>
+              <a:t> : [ 6, 6, 3, 6, 8, 8, 4, 8, 1, 8 ]</a:t>
+            </a:r>
+          </a:p>
+          <a:p>
+            <a:pPr marL="45720" indent="0">
+              <a:buNone/>
+            </a:pPr>
+            <a:r>
+              <a:rPr lang="en-US" sz="1800" dirty="0" err="1">
+                <a:latin typeface="Calibri" panose="020F0502020204030204" pitchFamily="34" charset="0"/>
+                <a:cs typeface="Calibri" panose="020F0502020204030204" pitchFamily="34" charset="0"/>
+              </a:rPr>
+              <a:t>arial_tho_diawal</a:t>
+            </a:r>
+            <a:r>
+              <a:rPr lang="en-US" sz="1800" dirty="0">
+                <a:latin typeface="Calibri" panose="020F0502020204030204" pitchFamily="34" charset="0"/>
+                <a:cs typeface="Calibri" panose="020F0502020204030204" pitchFamily="34" charset="0"/>
+              </a:rPr>
+              <a:t> :  [ 6, 6, 3, 5, 8, 8, 4, 4, 8, 8 ]</a:t>
+            </a:r>
+          </a:p>
+          <a:p>
+            <a:pPr marL="45720" indent="0">
+              <a:buNone/>
+            </a:pPr>
+            <a:r>
+              <a:rPr lang="en-US" sz="1800" dirty="0" err="1">
+                <a:latin typeface="Calibri" panose="020F0502020204030204" pitchFamily="34" charset="0"/>
+                <a:cs typeface="Calibri" panose="020F0502020204030204" pitchFamily="34" charset="0"/>
+              </a:rPr>
+              <a:t>arial_tho_ditengah</a:t>
+            </a:r>
+            <a:r>
+              <a:rPr lang="en-US" sz="1800" dirty="0">
+                <a:latin typeface="Calibri" panose="020F0502020204030204" pitchFamily="34" charset="0"/>
+                <a:cs typeface="Calibri" panose="020F0502020204030204" pitchFamily="34" charset="0"/>
+              </a:rPr>
+              <a:t> : [ 6, 6, 3, 6, 8, 2, 4, 8, 1, 7 ]</a:t>
+            </a:r>
+          </a:p>
+          <a:p>
+            <a:pPr marL="45720" indent="0">
+              <a:buNone/>
+            </a:pPr>
+            <a:r>
+              <a:rPr lang="en-US" sz="1800" dirty="0" err="1">
+                <a:latin typeface="Calibri" panose="020F0502020204030204" pitchFamily="34" charset="0"/>
+                <a:cs typeface="Calibri" panose="020F0502020204030204" pitchFamily="34" charset="0"/>
+              </a:rPr>
+              <a:t>arial_tho_terpisah</a:t>
+            </a:r>
+            <a:r>
+              <a:rPr lang="en-US" sz="1800" dirty="0">
+                <a:latin typeface="Calibri" panose="020F0502020204030204" pitchFamily="34" charset="0"/>
+                <a:cs typeface="Calibri" panose="020F0502020204030204" pitchFamily="34" charset="0"/>
+              </a:rPr>
+              <a:t> : [ 6, 6, 3, 5, 8, 8, 4, 4, 8, 8 ]</a:t>
+            </a:r>
+          </a:p>
+          <a:p>
+            <a:pPr marL="45720" indent="0">
+              <a:buFont typeface="Corbel" pitchFamily="34" charset="0"/>
+              <a:buNone/>
+            </a:pPr>
+            <a:endParaRPr lang="en-US" sz="1800" dirty="0">
+              <a:latin typeface="Calibri" panose="020F0502020204030204" pitchFamily="34" charset="0"/>
+              <a:cs typeface="Calibri" panose="020F0502020204030204" pitchFamily="34" charset="0"/>
+            </a:endParaRPr>
+          </a:p>
+        </p:txBody>
+      </p:sp>
+    </p:spTree>
+    <p:extLst>
+      <p:ext uri="{BB962C8B-B14F-4D97-AF65-F5344CB8AC3E}">
+        <p14:creationId xmlns:p14="http://schemas.microsoft.com/office/powerpoint/2010/main" val="4176114326"/>
+      </p:ext>
+    </p:extLst>
+  </p:cSld>
+  <p:clrMapOvr>
+    <a:masterClrMapping/>
+  </p:clrMapOvr>
+</p:sld>
+</file>
+
+<file path=ppt/slides/slide67.xml><?xml version="1.0" encoding="utf-8"?>
+<p:sld xmlns:a="http://schemas.openxmlformats.org/drawingml/2006/main" xmlns:r="http://schemas.openxmlformats.org/officeDocument/2006/relationships" xmlns:p="http://schemas.openxmlformats.org/presentationml/2006/main">
+  <p:cSld>
+    <p:spTree>
+      <p:nvGrpSpPr>
+        <p:cNvPr id="1" name=""/>
+        <p:cNvGrpSpPr/>
+        <p:nvPr/>
+      </p:nvGrpSpPr>
+      <p:grpSpPr>
+        <a:xfrm>
+          <a:off x="0" y="0"/>
+          <a:ext cx="0" cy="0"/>
+          <a:chOff x="0" y="0"/>
+          <a:chExt cx="0" cy="0"/>
+        </a:xfrm>
+      </p:grpSpPr>
+      <p:sp>
+        <p:nvSpPr>
+          <p:cNvPr id="2" name="Title 1">
+            <a:extLst>
+              <a:ext uri="{FF2B5EF4-FFF2-40B4-BE49-F238E27FC236}">
+                <a16:creationId xmlns:a16="http://schemas.microsoft.com/office/drawing/2014/main" id="{50A2B6B5-6DC0-442A-A543-F2324A8445F9}"/>
+              </a:ext>
+            </a:extLst>
+          </p:cNvPr>
+          <p:cNvSpPr>
+            <a:spLocks noGrp="1"/>
+          </p:cNvSpPr>
+          <p:nvPr>
+            <p:ph type="title"/>
+          </p:nvPr>
+        </p:nvSpPr>
+        <p:spPr>
+          <a:xfrm>
+            <a:off x="294967" y="609600"/>
+            <a:ext cx="11621729" cy="555523"/>
+          </a:xfrm>
+        </p:spPr>
+        <p:txBody>
+          <a:bodyPr>
+            <a:noAutofit/>
+          </a:bodyPr>
+          <a:lstStyle/>
+          <a:p>
+            <a:pPr algn="ctr"/>
+            <a:r>
+              <a:rPr lang="en-US" sz="2800" dirty="0" err="1"/>
+              <a:t>Hasil</a:t>
+            </a:r>
+            <a:r>
+              <a:rPr lang="en-US" sz="2800" dirty="0"/>
+              <a:t> </a:t>
+            </a:r>
+            <a:r>
+              <a:rPr lang="en-US" sz="2800" dirty="0" err="1"/>
+              <a:t>Pengenalan</a:t>
+            </a:r>
+            <a:r>
+              <a:rPr lang="en-US" sz="2800" dirty="0"/>
+              <a:t> </a:t>
+            </a:r>
+            <a:r>
+              <a:rPr lang="en-US" sz="2800" dirty="0" err="1"/>
+              <a:t>Huruf</a:t>
+            </a:r>
+            <a:r>
+              <a:rPr lang="en-US" sz="2800" dirty="0"/>
+              <a:t> Arab Tunggal </a:t>
+            </a:r>
+            <a:r>
+              <a:rPr lang="en-US" sz="2800" dirty="0" err="1"/>
+              <a:t>dengan</a:t>
+            </a:r>
+            <a:r>
+              <a:rPr lang="en-US" sz="2800" dirty="0"/>
+              <a:t> Font Microsoft SS, </a:t>
+            </a:r>
+            <a:r>
+              <a:rPr lang="en-US" sz="2800" dirty="0" err="1">
+                <a:latin typeface="Calibri" panose="020F0502020204030204" pitchFamily="34" charset="0"/>
+                <a:cs typeface="Calibri" panose="020F0502020204030204" pitchFamily="34" charset="0"/>
+              </a:rPr>
+              <a:t>Akurasi</a:t>
+            </a:r>
+            <a:r>
+              <a:rPr lang="en-US" sz="2800" dirty="0">
+                <a:latin typeface="Calibri" panose="020F0502020204030204" pitchFamily="34" charset="0"/>
+                <a:cs typeface="Calibri" panose="020F0502020204030204" pitchFamily="34" charset="0"/>
+              </a:rPr>
+              <a:t> 48%</a:t>
+            </a:r>
+            <a:endParaRPr lang="en-US" sz="2800" dirty="0"/>
+          </a:p>
+        </p:txBody>
+      </p:sp>
+      <p:pic>
+        <p:nvPicPr>
+          <p:cNvPr id="7" name="Content Placeholder 6">
+            <a:extLst>
+              <a:ext uri="{FF2B5EF4-FFF2-40B4-BE49-F238E27FC236}">
+                <a16:creationId xmlns:a16="http://schemas.microsoft.com/office/drawing/2014/main" id="{A8273CC0-7CDB-4072-A0E0-8E7FB87BE3B8}"/>
+              </a:ext>
+            </a:extLst>
+          </p:cNvPr>
+          <p:cNvPicPr>
+            <a:picLocks noGrp="1" noChangeAspect="1"/>
+          </p:cNvPicPr>
+          <p:nvPr>
+            <p:ph idx="1"/>
+          </p:nvPr>
+        </p:nvPicPr>
+        <p:blipFill>
+          <a:blip r:embed="rId2"/>
+          <a:stretch>
+            <a:fillRect/>
+          </a:stretch>
+        </p:blipFill>
+        <p:spPr>
+          <a:xfrm>
+            <a:off x="536958" y="1439934"/>
+            <a:ext cx="5530448" cy="4975614"/>
+          </a:xfrm>
+        </p:spPr>
+      </p:pic>
+      <p:pic>
+        <p:nvPicPr>
+          <p:cNvPr id="9" name="Picture 8">
+            <a:extLst>
+              <a:ext uri="{FF2B5EF4-FFF2-40B4-BE49-F238E27FC236}">
+                <a16:creationId xmlns:a16="http://schemas.microsoft.com/office/drawing/2014/main" id="{A7EC1B20-AED7-48D4-BAEC-9F0AB5C480A8}"/>
+              </a:ext>
+            </a:extLst>
+          </p:cNvPr>
+          <p:cNvPicPr>
+            <a:picLocks noChangeAspect="1"/>
+          </p:cNvPicPr>
+          <p:nvPr/>
+        </p:nvPicPr>
+        <p:blipFill>
+          <a:blip r:embed="rId3"/>
+          <a:stretch>
+            <a:fillRect/>
+          </a:stretch>
+        </p:blipFill>
+        <p:spPr>
+          <a:xfrm>
+            <a:off x="5338890" y="1439934"/>
+            <a:ext cx="5949104" cy="4975614"/>
+          </a:xfrm>
+          <a:prstGeom prst="rect">
+            <a:avLst/>
+          </a:prstGeom>
+        </p:spPr>
+      </p:pic>
+    </p:spTree>
+    <p:extLst>
+      <p:ext uri="{BB962C8B-B14F-4D97-AF65-F5344CB8AC3E}">
+        <p14:creationId xmlns:p14="http://schemas.microsoft.com/office/powerpoint/2010/main" val="2366485440"/>
+      </p:ext>
+    </p:extLst>
+  </p:cSld>
+  <p:clrMapOvr>
+    <a:masterClrMapping/>
+  </p:clrMapOvr>
+</p:sld>
+</file>
+
+<file path=ppt/slides/slide68.xml><?xml version="1.0" encoding="utf-8"?>
+<p:sld xmlns:a="http://schemas.openxmlformats.org/drawingml/2006/main" xmlns:r="http://schemas.openxmlformats.org/officeDocument/2006/relationships" xmlns:p="http://schemas.openxmlformats.org/presentationml/2006/main">
+  <p:cSld>
+    <p:spTree>
+      <p:nvGrpSpPr>
+        <p:cNvPr id="1" name=""/>
+        <p:cNvGrpSpPr/>
+        <p:nvPr/>
+      </p:nvGrpSpPr>
+      <p:grpSpPr>
+        <a:xfrm>
+          <a:off x="0" y="0"/>
+          <a:ext cx="0" cy="0"/>
+          <a:chOff x="0" y="0"/>
+          <a:chExt cx="0" cy="0"/>
+        </a:xfrm>
+      </p:grpSpPr>
+      <p:sp>
+        <p:nvSpPr>
+          <p:cNvPr id="2" name="Title 1">
+            <a:extLst>
+              <a:ext uri="{FF2B5EF4-FFF2-40B4-BE49-F238E27FC236}">
+                <a16:creationId xmlns:a16="http://schemas.microsoft.com/office/drawing/2014/main" id="{50A2B6B5-6DC0-442A-A543-F2324A8445F9}"/>
+              </a:ext>
+            </a:extLst>
+          </p:cNvPr>
+          <p:cNvSpPr>
+            <a:spLocks noGrp="1"/>
+          </p:cNvSpPr>
+          <p:nvPr>
+            <p:ph type="title"/>
+          </p:nvPr>
+        </p:nvSpPr>
+        <p:spPr>
+          <a:xfrm>
+            <a:off x="339213" y="609600"/>
+            <a:ext cx="11592232" cy="555523"/>
+          </a:xfrm>
+        </p:spPr>
+        <p:txBody>
+          <a:bodyPr>
+            <a:noAutofit/>
+          </a:bodyPr>
+          <a:lstStyle/>
+          <a:p>
+            <a:pPr algn="ctr"/>
+            <a:r>
+              <a:rPr lang="en-US" sz="2800" dirty="0" err="1"/>
+              <a:t>Hasil</a:t>
+            </a:r>
+            <a:r>
+              <a:rPr lang="en-US" sz="2800" dirty="0"/>
+              <a:t> </a:t>
+            </a:r>
+            <a:r>
+              <a:rPr lang="en-US" sz="2800" dirty="0" err="1"/>
+              <a:t>Pengenalan</a:t>
+            </a:r>
+            <a:r>
+              <a:rPr lang="en-US" sz="2800" dirty="0"/>
+              <a:t> </a:t>
+            </a:r>
+            <a:r>
+              <a:rPr lang="en-US" sz="2800" dirty="0" err="1"/>
+              <a:t>Huruf</a:t>
+            </a:r>
+            <a:r>
+              <a:rPr lang="en-US" sz="2800" dirty="0"/>
+              <a:t> Arab Tunggal </a:t>
+            </a:r>
+            <a:r>
+              <a:rPr lang="en-US" sz="2800" dirty="0" err="1"/>
+              <a:t>dengan</a:t>
+            </a:r>
+            <a:r>
+              <a:rPr lang="en-US" sz="2800" dirty="0"/>
+              <a:t> Font </a:t>
+            </a:r>
+            <a:r>
+              <a:rPr lang="en-US" sz="2800" dirty="0" err="1"/>
+              <a:t>Nazanin</a:t>
+            </a:r>
+            <a:r>
+              <a:rPr lang="en-US" sz="2800" dirty="0"/>
+              <a:t>, </a:t>
+            </a:r>
+            <a:r>
+              <a:rPr lang="en-US" sz="2800" dirty="0" err="1">
+                <a:latin typeface="Calibri" panose="020F0502020204030204" pitchFamily="34" charset="0"/>
+                <a:cs typeface="Calibri" panose="020F0502020204030204" pitchFamily="34" charset="0"/>
+              </a:rPr>
+              <a:t>Akurasi</a:t>
+            </a:r>
+            <a:r>
+              <a:rPr lang="en-US" sz="2800" dirty="0">
+                <a:latin typeface="Calibri" panose="020F0502020204030204" pitchFamily="34" charset="0"/>
+                <a:cs typeface="Calibri" panose="020F0502020204030204" pitchFamily="34" charset="0"/>
+              </a:rPr>
+              <a:t> 48%</a:t>
+            </a:r>
+            <a:endParaRPr lang="en-US" sz="2800" dirty="0"/>
+          </a:p>
+        </p:txBody>
+      </p:sp>
+      <p:pic>
+        <p:nvPicPr>
+          <p:cNvPr id="12" name="Content Placeholder 11">
+            <a:extLst>
+              <a:ext uri="{FF2B5EF4-FFF2-40B4-BE49-F238E27FC236}">
+                <a16:creationId xmlns:a16="http://schemas.microsoft.com/office/drawing/2014/main" id="{98CD927A-9D79-4A85-A3B6-78B58C61DBCD}"/>
+              </a:ext>
+            </a:extLst>
+          </p:cNvPr>
+          <p:cNvPicPr>
+            <a:picLocks noGrp="1" noChangeAspect="1"/>
+          </p:cNvPicPr>
+          <p:nvPr>
+            <p:ph idx="1"/>
+          </p:nvPr>
+        </p:nvPicPr>
+        <p:blipFill>
+          <a:blip r:embed="rId2"/>
+          <a:stretch>
+            <a:fillRect/>
+          </a:stretch>
+        </p:blipFill>
+        <p:spPr>
+          <a:xfrm>
+            <a:off x="924150" y="1464934"/>
+            <a:ext cx="4267281" cy="4933481"/>
+          </a:xfrm>
+        </p:spPr>
+      </p:pic>
+      <p:pic>
+        <p:nvPicPr>
+          <p:cNvPr id="14" name="Picture 13">
+            <a:extLst>
+              <a:ext uri="{FF2B5EF4-FFF2-40B4-BE49-F238E27FC236}">
+                <a16:creationId xmlns:a16="http://schemas.microsoft.com/office/drawing/2014/main" id="{161E5059-727A-497B-8A9E-B7A703C9D178}"/>
+              </a:ext>
+            </a:extLst>
+          </p:cNvPr>
+          <p:cNvPicPr>
+            <a:picLocks noChangeAspect="1"/>
+          </p:cNvPicPr>
+          <p:nvPr/>
+        </p:nvPicPr>
+        <p:blipFill>
+          <a:blip r:embed="rId3"/>
+          <a:stretch>
+            <a:fillRect/>
+          </a:stretch>
+        </p:blipFill>
+        <p:spPr>
+          <a:xfrm>
+            <a:off x="5870911" y="1464934"/>
+            <a:ext cx="4733180" cy="5109683"/>
+          </a:xfrm>
+          <a:prstGeom prst="rect">
+            <a:avLst/>
+          </a:prstGeom>
+        </p:spPr>
+      </p:pic>
+    </p:spTree>
+    <p:extLst>
+      <p:ext uri="{BB962C8B-B14F-4D97-AF65-F5344CB8AC3E}">
+        <p14:creationId xmlns:p14="http://schemas.microsoft.com/office/powerpoint/2010/main" val="894981509"/>
+      </p:ext>
+    </p:extLst>
+  </p:cSld>
+  <p:clrMapOvr>
+    <a:masterClrMapping/>
+  </p:clrMapOvr>
+</p:sld>
+</file>
+
+<file path=ppt/slides/slide69.xml><?xml version="1.0" encoding="utf-8"?>
+<p:sld xmlns:a="http://schemas.openxmlformats.org/drawingml/2006/main" xmlns:r="http://schemas.openxmlformats.org/officeDocument/2006/relationships" xmlns:p="http://schemas.openxmlformats.org/presentationml/2006/main">
+  <p:cSld>
+    <p:spTree>
+      <p:nvGrpSpPr>
+        <p:cNvPr id="1" name=""/>
+        <p:cNvGrpSpPr/>
+        <p:nvPr/>
+      </p:nvGrpSpPr>
+      <p:grpSpPr>
+        <a:xfrm>
+          <a:off x="0" y="0"/>
+          <a:ext cx="0" cy="0"/>
+          <a:chOff x="0" y="0"/>
+          <a:chExt cx="0" cy="0"/>
+        </a:xfrm>
+      </p:grpSpPr>
+      <p:sp>
+        <p:nvSpPr>
+          <p:cNvPr id="2" name="Title 1">
+            <a:extLst>
+              <a:ext uri="{FF2B5EF4-FFF2-40B4-BE49-F238E27FC236}">
+                <a16:creationId xmlns:a16="http://schemas.microsoft.com/office/drawing/2014/main" id="{6251E21D-0742-4642-AE12-243E8830E6FF}"/>
+              </a:ext>
+            </a:extLst>
+          </p:cNvPr>
+          <p:cNvSpPr>
+            <a:spLocks noGrp="1"/>
+          </p:cNvSpPr>
+          <p:nvPr>
+            <p:ph type="title"/>
+          </p:nvPr>
+        </p:nvSpPr>
+        <p:spPr>
+          <a:xfrm>
+            <a:off x="1143000" y="285136"/>
+            <a:ext cx="9875520" cy="1356360"/>
+          </a:xfrm>
+        </p:spPr>
+        <p:txBody>
+          <a:bodyPr>
+            <a:noAutofit/>
+          </a:bodyPr>
+          <a:lstStyle/>
+          <a:p>
+            <a:pPr algn="ctr"/>
+            <a:r>
+              <a:rPr lang="en-US" sz="2400" dirty="0" err="1">
+                <a:latin typeface="Calibri" panose="020F0502020204030204" pitchFamily="34" charset="0"/>
+                <a:cs typeface="Calibri" panose="020F0502020204030204" pitchFamily="34" charset="0"/>
+              </a:rPr>
+              <a:t>Hasil</a:t>
+            </a:r>
+            <a:r>
+              <a:rPr lang="en-US" sz="2400" dirty="0">
+                <a:latin typeface="Calibri" panose="020F0502020204030204" pitchFamily="34" charset="0"/>
+                <a:cs typeface="Calibri" panose="020F0502020204030204" pitchFamily="34" charset="0"/>
+              </a:rPr>
+              <a:t> </a:t>
+            </a:r>
+            <a:r>
+              <a:rPr lang="en-US" sz="2400" dirty="0" err="1">
+                <a:latin typeface="Calibri" panose="020F0502020204030204" pitchFamily="34" charset="0"/>
+                <a:cs typeface="Calibri" panose="020F0502020204030204" pitchFamily="34" charset="0"/>
+              </a:rPr>
+              <a:t>Pengenalan</a:t>
+            </a:r>
+            <a:r>
+              <a:rPr lang="en-US" sz="2400" dirty="0">
+                <a:latin typeface="Calibri" panose="020F0502020204030204" pitchFamily="34" charset="0"/>
+                <a:cs typeface="Calibri" panose="020F0502020204030204" pitchFamily="34" charset="0"/>
+              </a:rPr>
+              <a:t> </a:t>
+            </a:r>
+            <a:r>
+              <a:rPr lang="en-US" sz="2400" dirty="0" err="1">
+                <a:latin typeface="Calibri" panose="020F0502020204030204" pitchFamily="34" charset="0"/>
+                <a:cs typeface="Calibri" panose="020F0502020204030204" pitchFamily="34" charset="0"/>
+              </a:rPr>
+              <a:t>Huruf</a:t>
+            </a:r>
+            <a:r>
+              <a:rPr lang="en-US" sz="2400" dirty="0">
+                <a:latin typeface="Calibri" panose="020F0502020204030204" pitchFamily="34" charset="0"/>
+                <a:cs typeface="Calibri" panose="020F0502020204030204" pitchFamily="34" charset="0"/>
+              </a:rPr>
+              <a:t> Arab Tunggal </a:t>
+            </a:r>
+            <a:r>
+              <a:rPr lang="en-US" sz="2400" dirty="0" err="1">
+                <a:latin typeface="Calibri" panose="020F0502020204030204" pitchFamily="34" charset="0"/>
+                <a:cs typeface="Calibri" panose="020F0502020204030204" pitchFamily="34" charset="0"/>
+              </a:rPr>
+              <a:t>dengan</a:t>
+            </a:r>
+            <a:r>
+              <a:rPr lang="en-US" sz="2400" dirty="0">
+                <a:latin typeface="Calibri" panose="020F0502020204030204" pitchFamily="34" charset="0"/>
+                <a:cs typeface="Calibri" panose="020F0502020204030204" pitchFamily="34" charset="0"/>
+              </a:rPr>
+              <a:t> Font Times New Roman, </a:t>
+            </a:r>
+            <a:r>
+              <a:rPr lang="en-US" sz="2400" dirty="0" err="1">
+                <a:latin typeface="Calibri" panose="020F0502020204030204" pitchFamily="34" charset="0"/>
+                <a:cs typeface="Calibri" panose="020F0502020204030204" pitchFamily="34" charset="0"/>
+              </a:rPr>
+              <a:t>Normalisasi</a:t>
+            </a:r>
+            <a:r>
+              <a:rPr lang="en-US" sz="2400" dirty="0">
+                <a:latin typeface="Calibri" panose="020F0502020204030204" pitchFamily="34" charset="0"/>
+                <a:cs typeface="Calibri" panose="020F0502020204030204" pitchFamily="34" charset="0"/>
+              </a:rPr>
+              <a:t> Chain code 15</a:t>
+            </a:r>
+          </a:p>
+        </p:txBody>
+      </p:sp>
+      <p:pic>
+        <p:nvPicPr>
+          <p:cNvPr id="8" name="Content Placeholder 7">
+            <a:extLst>
+              <a:ext uri="{FF2B5EF4-FFF2-40B4-BE49-F238E27FC236}">
+                <a16:creationId xmlns:a16="http://schemas.microsoft.com/office/drawing/2014/main" id="{5C941CD8-3E1B-4C38-B792-C867BD5DE57D}"/>
+              </a:ext>
+            </a:extLst>
+          </p:cNvPr>
+          <p:cNvPicPr>
+            <a:picLocks noGrp="1" noChangeAspect="1"/>
+          </p:cNvPicPr>
+          <p:nvPr>
+            <p:ph idx="1"/>
+          </p:nvPr>
+        </p:nvPicPr>
+        <p:blipFill>
+          <a:blip r:embed="rId2"/>
+          <a:stretch>
+            <a:fillRect/>
+          </a:stretch>
+        </p:blipFill>
+        <p:spPr>
+          <a:xfrm>
+            <a:off x="699824" y="1641496"/>
+            <a:ext cx="4816073" cy="4696098"/>
+          </a:xfrm>
+        </p:spPr>
+      </p:pic>
+      <p:pic>
+        <p:nvPicPr>
+          <p:cNvPr id="10" name="Picture 9">
+            <a:extLst>
+              <a:ext uri="{FF2B5EF4-FFF2-40B4-BE49-F238E27FC236}">
+                <a16:creationId xmlns:a16="http://schemas.microsoft.com/office/drawing/2014/main" id="{496898D8-0020-4398-B7ED-B514BF645711}"/>
+              </a:ext>
+            </a:extLst>
+          </p:cNvPr>
+          <p:cNvPicPr>
+            <a:picLocks noChangeAspect="1"/>
+          </p:cNvPicPr>
+          <p:nvPr/>
+        </p:nvPicPr>
+        <p:blipFill>
+          <a:blip r:embed="rId3"/>
+          <a:stretch>
+            <a:fillRect/>
+          </a:stretch>
+        </p:blipFill>
+        <p:spPr>
+          <a:xfrm>
+            <a:off x="6555231" y="1641496"/>
+            <a:ext cx="4730502" cy="4696098"/>
+          </a:xfrm>
+          <a:prstGeom prst="rect">
+            <a:avLst/>
+          </a:prstGeom>
+        </p:spPr>
+      </p:pic>
+    </p:spTree>
+    <p:extLst>
+      <p:ext uri="{BB962C8B-B14F-4D97-AF65-F5344CB8AC3E}">
+        <p14:creationId xmlns:p14="http://schemas.microsoft.com/office/powerpoint/2010/main" val="1858800595"/>
       </p:ext>
     </p:extLst>
   </p:cSld>
@@ -28243,6 +30119,1213 @@
     <p:extLst>
       <p:ext uri="{BB962C8B-B14F-4D97-AF65-F5344CB8AC3E}">
         <p14:creationId xmlns:p14="http://schemas.microsoft.com/office/powerpoint/2010/main" val="2093245730"/>
+      </p:ext>
+    </p:extLst>
+  </p:cSld>
+  <p:clrMapOvr>
+    <a:masterClrMapping/>
+  </p:clrMapOvr>
+</p:sld>
+</file>
+
+<file path=ppt/slides/slide70.xml><?xml version="1.0" encoding="utf-8"?>
+<p:sld xmlns:a="http://schemas.openxmlformats.org/drawingml/2006/main" xmlns:r="http://schemas.openxmlformats.org/officeDocument/2006/relationships" xmlns:p="http://schemas.openxmlformats.org/presentationml/2006/main">
+  <p:cSld>
+    <p:spTree>
+      <p:nvGrpSpPr>
+        <p:cNvPr id="1" name=""/>
+        <p:cNvGrpSpPr/>
+        <p:nvPr/>
+      </p:nvGrpSpPr>
+      <p:grpSpPr>
+        <a:xfrm>
+          <a:off x="0" y="0"/>
+          <a:ext cx="0" cy="0"/>
+          <a:chOff x="0" y="0"/>
+          <a:chExt cx="0" cy="0"/>
+        </a:xfrm>
+      </p:grpSpPr>
+      <p:sp>
+        <p:nvSpPr>
+          <p:cNvPr id="2" name="Title 1">
+            <a:extLst>
+              <a:ext uri="{FF2B5EF4-FFF2-40B4-BE49-F238E27FC236}">
+                <a16:creationId xmlns:a16="http://schemas.microsoft.com/office/drawing/2014/main" id="{6251E21D-0742-4642-AE12-243E8830E6FF}"/>
+              </a:ext>
+            </a:extLst>
+          </p:cNvPr>
+          <p:cNvSpPr>
+            <a:spLocks noGrp="1"/>
+          </p:cNvSpPr>
+          <p:nvPr>
+            <p:ph type="title"/>
+          </p:nvPr>
+        </p:nvSpPr>
+        <p:spPr>
+          <a:xfrm>
+            <a:off x="1143000" y="285136"/>
+            <a:ext cx="9875520" cy="1356360"/>
+          </a:xfrm>
+        </p:spPr>
+        <p:txBody>
+          <a:bodyPr>
+            <a:noAutofit/>
+          </a:bodyPr>
+          <a:lstStyle/>
+          <a:p>
+            <a:pPr algn="ctr"/>
+            <a:r>
+              <a:rPr lang="en-US" sz="2400" dirty="0" err="1"/>
+              <a:t>Hasil</a:t>
+            </a:r>
+            <a:r>
+              <a:rPr lang="en-US" sz="2400" dirty="0"/>
+              <a:t> </a:t>
+            </a:r>
+            <a:r>
+              <a:rPr lang="en-US" sz="2400" dirty="0" err="1"/>
+              <a:t>Pengenalan</a:t>
+            </a:r>
+            <a:r>
+              <a:rPr lang="en-US" sz="2400" dirty="0"/>
+              <a:t> </a:t>
+            </a:r>
+            <a:r>
+              <a:rPr lang="en-US" sz="2400" dirty="0" err="1"/>
+              <a:t>Huruf</a:t>
+            </a:r>
+            <a:r>
+              <a:rPr lang="en-US" sz="2400" dirty="0"/>
+              <a:t> Arab Tunggal </a:t>
+            </a:r>
+            <a:r>
+              <a:rPr lang="en-US" sz="2400" dirty="0" err="1"/>
+              <a:t>dengan</a:t>
+            </a:r>
+            <a:r>
+              <a:rPr lang="en-US" sz="2400" dirty="0"/>
+              <a:t> Font Tahoma, </a:t>
+            </a:r>
+            <a:br>
+              <a:rPr lang="en-US" sz="2400" dirty="0"/>
+            </a:br>
+            <a:r>
+              <a:rPr lang="en-US" sz="2400" dirty="0" err="1"/>
+              <a:t>Normalisasi</a:t>
+            </a:r>
+            <a:r>
+              <a:rPr lang="en-US" sz="2400" dirty="0"/>
+              <a:t> Chain code 15</a:t>
+            </a:r>
+          </a:p>
+        </p:txBody>
+      </p:sp>
+      <p:pic>
+        <p:nvPicPr>
+          <p:cNvPr id="6" name="Content Placeholder 5">
+            <a:extLst>
+              <a:ext uri="{FF2B5EF4-FFF2-40B4-BE49-F238E27FC236}">
+                <a16:creationId xmlns:a16="http://schemas.microsoft.com/office/drawing/2014/main" id="{31719A47-7BFC-4CBD-9D1E-BB230CA8920C}"/>
+              </a:ext>
+            </a:extLst>
+          </p:cNvPr>
+          <p:cNvPicPr>
+            <a:picLocks noGrp="1" noChangeAspect="1"/>
+          </p:cNvPicPr>
+          <p:nvPr>
+            <p:ph idx="1"/>
+          </p:nvPr>
+        </p:nvPicPr>
+        <p:blipFill>
+          <a:blip r:embed="rId2"/>
+          <a:stretch>
+            <a:fillRect/>
+          </a:stretch>
+        </p:blipFill>
+        <p:spPr>
+          <a:xfrm>
+            <a:off x="6427878" y="1641496"/>
+            <a:ext cx="4986618" cy="4759954"/>
+          </a:xfrm>
+        </p:spPr>
+      </p:pic>
+      <p:pic>
+        <p:nvPicPr>
+          <p:cNvPr id="9" name="Picture 8">
+            <a:extLst>
+              <a:ext uri="{FF2B5EF4-FFF2-40B4-BE49-F238E27FC236}">
+                <a16:creationId xmlns:a16="http://schemas.microsoft.com/office/drawing/2014/main" id="{472485F4-F3FC-4AC2-B236-9B3525C125AA}"/>
+              </a:ext>
+            </a:extLst>
+          </p:cNvPr>
+          <p:cNvPicPr>
+            <a:picLocks noChangeAspect="1"/>
+          </p:cNvPicPr>
+          <p:nvPr/>
+        </p:nvPicPr>
+        <p:blipFill>
+          <a:blip r:embed="rId3"/>
+          <a:stretch>
+            <a:fillRect/>
+          </a:stretch>
+        </p:blipFill>
+        <p:spPr>
+          <a:xfrm>
+            <a:off x="840904" y="1641496"/>
+            <a:ext cx="5471405" cy="4759954"/>
+          </a:xfrm>
+          <a:prstGeom prst="rect">
+            <a:avLst/>
+          </a:prstGeom>
+        </p:spPr>
+      </p:pic>
+    </p:spTree>
+    <p:extLst>
+      <p:ext uri="{BB962C8B-B14F-4D97-AF65-F5344CB8AC3E}">
+        <p14:creationId xmlns:p14="http://schemas.microsoft.com/office/powerpoint/2010/main" val="1272117643"/>
+      </p:ext>
+    </p:extLst>
+  </p:cSld>
+  <p:clrMapOvr>
+    <a:masterClrMapping/>
+  </p:clrMapOvr>
+</p:sld>
+</file>
+
+<file path=ppt/slides/slide71.xml><?xml version="1.0" encoding="utf-8"?>
+<p:sld xmlns:a="http://schemas.openxmlformats.org/drawingml/2006/main" xmlns:r="http://schemas.openxmlformats.org/officeDocument/2006/relationships" xmlns:p="http://schemas.openxmlformats.org/presentationml/2006/main">
+  <p:cSld>
+    <p:spTree>
+      <p:nvGrpSpPr>
+        <p:cNvPr id="1" name=""/>
+        <p:cNvGrpSpPr/>
+        <p:nvPr/>
+      </p:nvGrpSpPr>
+      <p:grpSpPr>
+        <a:xfrm>
+          <a:off x="0" y="0"/>
+          <a:ext cx="0" cy="0"/>
+          <a:chOff x="0" y="0"/>
+          <a:chExt cx="0" cy="0"/>
+        </a:xfrm>
+      </p:grpSpPr>
+      <p:sp>
+        <p:nvSpPr>
+          <p:cNvPr id="2" name="Title 1">
+            <a:extLst>
+              <a:ext uri="{FF2B5EF4-FFF2-40B4-BE49-F238E27FC236}">
+                <a16:creationId xmlns:a16="http://schemas.microsoft.com/office/drawing/2014/main" id="{6251E21D-0742-4642-AE12-243E8830E6FF}"/>
+              </a:ext>
+            </a:extLst>
+          </p:cNvPr>
+          <p:cNvSpPr>
+            <a:spLocks noGrp="1"/>
+          </p:cNvSpPr>
+          <p:nvPr>
+            <p:ph type="title"/>
+          </p:nvPr>
+        </p:nvSpPr>
+        <p:spPr>
+          <a:xfrm>
+            <a:off x="1143000" y="285136"/>
+            <a:ext cx="9875520" cy="1356360"/>
+          </a:xfrm>
+        </p:spPr>
+        <p:txBody>
+          <a:bodyPr>
+            <a:noAutofit/>
+          </a:bodyPr>
+          <a:lstStyle/>
+          <a:p>
+            <a:pPr algn="ctr"/>
+            <a:r>
+              <a:rPr lang="en-US" sz="2400" dirty="0" err="1">
+                <a:latin typeface="Calibri" panose="020F0502020204030204" pitchFamily="34" charset="0"/>
+                <a:cs typeface="Calibri" panose="020F0502020204030204" pitchFamily="34" charset="0"/>
+              </a:rPr>
+              <a:t>Hasil</a:t>
+            </a:r>
+            <a:r>
+              <a:rPr lang="en-US" sz="2400" dirty="0"/>
+              <a:t> </a:t>
+            </a:r>
+            <a:r>
+              <a:rPr lang="en-US" sz="2400" dirty="0" err="1"/>
+              <a:t>Pengenalan</a:t>
+            </a:r>
+            <a:r>
+              <a:rPr lang="en-US" sz="2400" dirty="0"/>
+              <a:t> </a:t>
+            </a:r>
+            <a:r>
+              <a:rPr lang="en-US" sz="2400" dirty="0" err="1"/>
+              <a:t>Huruf</a:t>
+            </a:r>
+            <a:r>
+              <a:rPr lang="en-US" sz="2400" dirty="0"/>
+              <a:t> Arab Tunggal </a:t>
+            </a:r>
+            <a:r>
+              <a:rPr lang="en-US" sz="2400" dirty="0" err="1"/>
+              <a:t>dengan</a:t>
+            </a:r>
+            <a:r>
+              <a:rPr lang="en-US" sz="2400" dirty="0"/>
+              <a:t> Font Arial</a:t>
+            </a:r>
+            <a:br>
+              <a:rPr lang="en-US" sz="2400" dirty="0"/>
+            </a:br>
+            <a:r>
+              <a:rPr lang="en-US" sz="2400" dirty="0"/>
+              <a:t> </a:t>
+            </a:r>
+            <a:r>
+              <a:rPr lang="en-US" sz="2400" dirty="0" err="1"/>
+              <a:t>Normalisasi</a:t>
+            </a:r>
+            <a:r>
+              <a:rPr lang="en-US" sz="2400" dirty="0"/>
+              <a:t> Chain code 15</a:t>
+            </a:r>
+          </a:p>
+        </p:txBody>
+      </p:sp>
+      <p:pic>
+        <p:nvPicPr>
+          <p:cNvPr id="7" name="Content Placeholder 6">
+            <a:extLst>
+              <a:ext uri="{FF2B5EF4-FFF2-40B4-BE49-F238E27FC236}">
+                <a16:creationId xmlns:a16="http://schemas.microsoft.com/office/drawing/2014/main" id="{EF0E0E98-3679-45A1-8696-8D9F01B2BD8B}"/>
+              </a:ext>
+            </a:extLst>
+          </p:cNvPr>
+          <p:cNvPicPr>
+            <a:picLocks noGrp="1" noChangeAspect="1"/>
+          </p:cNvPicPr>
+          <p:nvPr>
+            <p:ph idx="1"/>
+          </p:nvPr>
+        </p:nvPicPr>
+        <p:blipFill>
+          <a:blip r:embed="rId2"/>
+          <a:stretch>
+            <a:fillRect/>
+          </a:stretch>
+        </p:blipFill>
+        <p:spPr>
+          <a:xfrm>
+            <a:off x="5945028" y="1903585"/>
+            <a:ext cx="4246108" cy="4261326"/>
+          </a:xfrm>
+        </p:spPr>
+      </p:pic>
+      <p:pic>
+        <p:nvPicPr>
+          <p:cNvPr id="10" name="Picture 9">
+            <a:extLst>
+              <a:ext uri="{FF2B5EF4-FFF2-40B4-BE49-F238E27FC236}">
+                <a16:creationId xmlns:a16="http://schemas.microsoft.com/office/drawing/2014/main" id="{F7FE90F7-1101-4587-B190-ADF226C7F560}"/>
+              </a:ext>
+            </a:extLst>
+          </p:cNvPr>
+          <p:cNvPicPr>
+            <a:picLocks noChangeAspect="1"/>
+          </p:cNvPicPr>
+          <p:nvPr/>
+        </p:nvPicPr>
+        <p:blipFill>
+          <a:blip r:embed="rId3"/>
+          <a:stretch>
+            <a:fillRect/>
+          </a:stretch>
+        </p:blipFill>
+        <p:spPr>
+          <a:xfrm>
+            <a:off x="1372195" y="1903585"/>
+            <a:ext cx="3848734" cy="4128910"/>
+          </a:xfrm>
+          <a:prstGeom prst="rect">
+            <a:avLst/>
+          </a:prstGeom>
+        </p:spPr>
+      </p:pic>
+    </p:spTree>
+    <p:extLst>
+      <p:ext uri="{BB962C8B-B14F-4D97-AF65-F5344CB8AC3E}">
+        <p14:creationId xmlns:p14="http://schemas.microsoft.com/office/powerpoint/2010/main" val="2157891656"/>
+      </p:ext>
+    </p:extLst>
+  </p:cSld>
+  <p:clrMapOvr>
+    <a:masterClrMapping/>
+  </p:clrMapOvr>
+</p:sld>
+</file>
+
+<file path=ppt/slides/slide72.xml><?xml version="1.0" encoding="utf-8"?>
+<p:sld xmlns:a="http://schemas.openxmlformats.org/drawingml/2006/main" xmlns:r="http://schemas.openxmlformats.org/officeDocument/2006/relationships" xmlns:p="http://schemas.openxmlformats.org/presentationml/2006/main">
+  <p:cSld>
+    <p:spTree>
+      <p:nvGrpSpPr>
+        <p:cNvPr id="1" name=""/>
+        <p:cNvGrpSpPr/>
+        <p:nvPr/>
+      </p:nvGrpSpPr>
+      <p:grpSpPr>
+        <a:xfrm>
+          <a:off x="0" y="0"/>
+          <a:ext cx="0" cy="0"/>
+          <a:chOff x="0" y="0"/>
+          <a:chExt cx="0" cy="0"/>
+        </a:xfrm>
+      </p:grpSpPr>
+      <p:sp>
+        <p:nvSpPr>
+          <p:cNvPr id="2" name="Title 1">
+            <a:extLst>
+              <a:ext uri="{FF2B5EF4-FFF2-40B4-BE49-F238E27FC236}">
+                <a16:creationId xmlns:a16="http://schemas.microsoft.com/office/drawing/2014/main" id="{6251E21D-0742-4642-AE12-243E8830E6FF}"/>
+              </a:ext>
+            </a:extLst>
+          </p:cNvPr>
+          <p:cNvSpPr>
+            <a:spLocks noGrp="1"/>
+          </p:cNvSpPr>
+          <p:nvPr>
+            <p:ph type="title"/>
+          </p:nvPr>
+        </p:nvSpPr>
+        <p:spPr>
+          <a:xfrm>
+            <a:off x="1143000" y="285136"/>
+            <a:ext cx="9875520" cy="1356360"/>
+          </a:xfrm>
+        </p:spPr>
+        <p:txBody>
+          <a:bodyPr>
+            <a:noAutofit/>
+          </a:bodyPr>
+          <a:lstStyle/>
+          <a:p>
+            <a:pPr algn="ctr"/>
+            <a:r>
+              <a:rPr lang="en-US" sz="2400" dirty="0" err="1">
+                <a:latin typeface="Calibri" panose="020F0502020204030204" pitchFamily="34" charset="0"/>
+                <a:cs typeface="Calibri" panose="020F0502020204030204" pitchFamily="34" charset="0"/>
+              </a:rPr>
+              <a:t>Hasil</a:t>
+            </a:r>
+            <a:r>
+              <a:rPr lang="en-US" sz="2400" dirty="0"/>
+              <a:t> </a:t>
+            </a:r>
+            <a:r>
+              <a:rPr lang="en-US" sz="2400" dirty="0" err="1"/>
+              <a:t>Pengenalan</a:t>
+            </a:r>
+            <a:r>
+              <a:rPr lang="en-US" sz="2400" dirty="0"/>
+              <a:t> </a:t>
+            </a:r>
+            <a:r>
+              <a:rPr lang="en-US" sz="2400" dirty="0" err="1"/>
+              <a:t>Huruf</a:t>
+            </a:r>
+            <a:r>
+              <a:rPr lang="en-US" sz="2400" dirty="0"/>
+              <a:t> Arab Tunggal </a:t>
+            </a:r>
+            <a:r>
+              <a:rPr lang="en-US" sz="2400" dirty="0" err="1"/>
+              <a:t>dengan</a:t>
+            </a:r>
+            <a:r>
+              <a:rPr lang="en-US" sz="2400" dirty="0"/>
+              <a:t> Font Segoe UI</a:t>
+            </a:r>
+            <a:br>
+              <a:rPr lang="en-US" sz="2400" dirty="0"/>
+            </a:br>
+            <a:r>
+              <a:rPr lang="en-US" sz="2400" dirty="0"/>
+              <a:t> </a:t>
+            </a:r>
+            <a:r>
+              <a:rPr lang="en-US" sz="2400" dirty="0" err="1"/>
+              <a:t>Normalisasi</a:t>
+            </a:r>
+            <a:r>
+              <a:rPr lang="en-US" sz="2400" dirty="0"/>
+              <a:t> Chain code 15</a:t>
+            </a:r>
+          </a:p>
+        </p:txBody>
+      </p:sp>
+      <p:pic>
+        <p:nvPicPr>
+          <p:cNvPr id="6" name="Content Placeholder 5">
+            <a:extLst>
+              <a:ext uri="{FF2B5EF4-FFF2-40B4-BE49-F238E27FC236}">
+                <a16:creationId xmlns:a16="http://schemas.microsoft.com/office/drawing/2014/main" id="{453D6446-0509-48E4-A14C-6B8F9A021A88}"/>
+              </a:ext>
+            </a:extLst>
+          </p:cNvPr>
+          <p:cNvPicPr>
+            <a:picLocks noGrp="1" noChangeAspect="1"/>
+          </p:cNvPicPr>
+          <p:nvPr>
+            <p:ph idx="1"/>
+          </p:nvPr>
+        </p:nvPicPr>
+        <p:blipFill>
+          <a:blip r:embed="rId2"/>
+          <a:stretch>
+            <a:fillRect/>
+          </a:stretch>
+        </p:blipFill>
+        <p:spPr>
+          <a:xfrm>
+            <a:off x="6340428" y="1641496"/>
+            <a:ext cx="5045327" cy="4755561"/>
+          </a:xfrm>
+        </p:spPr>
+      </p:pic>
+      <p:pic>
+        <p:nvPicPr>
+          <p:cNvPr id="9" name="Picture 8">
+            <a:extLst>
+              <a:ext uri="{FF2B5EF4-FFF2-40B4-BE49-F238E27FC236}">
+                <a16:creationId xmlns:a16="http://schemas.microsoft.com/office/drawing/2014/main" id="{7BB72EBF-8A3F-4C4B-9FB3-635B04A3E82A}"/>
+              </a:ext>
+            </a:extLst>
+          </p:cNvPr>
+          <p:cNvPicPr>
+            <a:picLocks noChangeAspect="1"/>
+          </p:cNvPicPr>
+          <p:nvPr/>
+        </p:nvPicPr>
+        <p:blipFill>
+          <a:blip r:embed="rId3"/>
+          <a:stretch>
+            <a:fillRect/>
+          </a:stretch>
+        </p:blipFill>
+        <p:spPr>
+          <a:xfrm>
+            <a:off x="1143000" y="1641496"/>
+            <a:ext cx="4356304" cy="4715059"/>
+          </a:xfrm>
+          <a:prstGeom prst="rect">
+            <a:avLst/>
+          </a:prstGeom>
+        </p:spPr>
+      </p:pic>
+    </p:spTree>
+    <p:extLst>
+      <p:ext uri="{BB962C8B-B14F-4D97-AF65-F5344CB8AC3E}">
+        <p14:creationId xmlns:p14="http://schemas.microsoft.com/office/powerpoint/2010/main" val="275977059"/>
+      </p:ext>
+    </p:extLst>
+  </p:cSld>
+  <p:clrMapOvr>
+    <a:masterClrMapping/>
+  </p:clrMapOvr>
+</p:sld>
+</file>
+
+<file path=ppt/slides/slide73.xml><?xml version="1.0" encoding="utf-8"?>
+<p:sld xmlns:a="http://schemas.openxmlformats.org/drawingml/2006/main" xmlns:r="http://schemas.openxmlformats.org/officeDocument/2006/relationships" xmlns:p="http://schemas.openxmlformats.org/presentationml/2006/main">
+  <p:cSld>
+    <p:spTree>
+      <p:nvGrpSpPr>
+        <p:cNvPr id="1" name=""/>
+        <p:cNvGrpSpPr/>
+        <p:nvPr/>
+      </p:nvGrpSpPr>
+      <p:grpSpPr>
+        <a:xfrm>
+          <a:off x="0" y="0"/>
+          <a:ext cx="0" cy="0"/>
+          <a:chOff x="0" y="0"/>
+          <a:chExt cx="0" cy="0"/>
+        </a:xfrm>
+      </p:grpSpPr>
+      <p:sp>
+        <p:nvSpPr>
+          <p:cNvPr id="2" name="Title 1">
+            <a:extLst>
+              <a:ext uri="{FF2B5EF4-FFF2-40B4-BE49-F238E27FC236}">
+                <a16:creationId xmlns:a16="http://schemas.microsoft.com/office/drawing/2014/main" id="{6251E21D-0742-4642-AE12-243E8830E6FF}"/>
+              </a:ext>
+            </a:extLst>
+          </p:cNvPr>
+          <p:cNvSpPr>
+            <a:spLocks noGrp="1"/>
+          </p:cNvSpPr>
+          <p:nvPr>
+            <p:ph type="title"/>
+          </p:nvPr>
+        </p:nvSpPr>
+        <p:spPr>
+          <a:xfrm>
+            <a:off x="1143000" y="285136"/>
+            <a:ext cx="9875520" cy="1356360"/>
+          </a:xfrm>
+        </p:spPr>
+        <p:txBody>
+          <a:bodyPr>
+            <a:noAutofit/>
+          </a:bodyPr>
+          <a:lstStyle/>
+          <a:p>
+            <a:pPr algn="ctr"/>
+            <a:r>
+              <a:rPr lang="en-US" sz="2400" dirty="0" err="1">
+                <a:latin typeface="Calibri" panose="020F0502020204030204" pitchFamily="34" charset="0"/>
+                <a:cs typeface="Calibri" panose="020F0502020204030204" pitchFamily="34" charset="0"/>
+              </a:rPr>
+              <a:t>Hasil</a:t>
+            </a:r>
+            <a:r>
+              <a:rPr lang="en-US" sz="2400" dirty="0"/>
+              <a:t> </a:t>
+            </a:r>
+            <a:r>
+              <a:rPr lang="en-US" sz="2400" dirty="0" err="1"/>
+              <a:t>Pengenalan</a:t>
+            </a:r>
+            <a:r>
+              <a:rPr lang="en-US" sz="2400" dirty="0"/>
+              <a:t> </a:t>
+            </a:r>
+            <a:r>
+              <a:rPr lang="en-US" sz="2400" dirty="0" err="1"/>
+              <a:t>Huruf</a:t>
+            </a:r>
+            <a:r>
+              <a:rPr lang="en-US" sz="2400" dirty="0"/>
+              <a:t> Arab Tunggal </a:t>
+            </a:r>
+            <a:r>
+              <a:rPr lang="en-US" sz="2400" dirty="0" err="1"/>
+              <a:t>dengan</a:t>
+            </a:r>
+            <a:r>
+              <a:rPr lang="en-US" sz="2400" dirty="0"/>
+              <a:t> Font Microsoft Sans Serif</a:t>
+            </a:r>
+            <a:br>
+              <a:rPr lang="en-US" sz="2400" dirty="0"/>
+            </a:br>
+            <a:r>
+              <a:rPr lang="en-US" sz="2400" dirty="0"/>
+              <a:t> </a:t>
+            </a:r>
+            <a:r>
+              <a:rPr lang="en-US" sz="2400" dirty="0" err="1"/>
+              <a:t>Normalisasi</a:t>
+            </a:r>
+            <a:r>
+              <a:rPr lang="en-US" sz="2400" dirty="0"/>
+              <a:t> Chain code 15</a:t>
+            </a:r>
+          </a:p>
+        </p:txBody>
+      </p:sp>
+      <p:pic>
+        <p:nvPicPr>
+          <p:cNvPr id="7" name="Content Placeholder 6">
+            <a:extLst>
+              <a:ext uri="{FF2B5EF4-FFF2-40B4-BE49-F238E27FC236}">
+                <a16:creationId xmlns:a16="http://schemas.microsoft.com/office/drawing/2014/main" id="{015CFB9E-66DE-4435-87AD-59D703CC9CC8}"/>
+              </a:ext>
+            </a:extLst>
+          </p:cNvPr>
+          <p:cNvPicPr>
+            <a:picLocks noGrp="1" noChangeAspect="1"/>
+          </p:cNvPicPr>
+          <p:nvPr>
+            <p:ph idx="1"/>
+          </p:nvPr>
+        </p:nvPicPr>
+        <p:blipFill>
+          <a:blip r:embed="rId2"/>
+          <a:stretch>
+            <a:fillRect/>
+          </a:stretch>
+        </p:blipFill>
+        <p:spPr>
+          <a:xfrm>
+            <a:off x="6294484" y="1641496"/>
+            <a:ext cx="4724036" cy="4674656"/>
+          </a:xfrm>
+        </p:spPr>
+      </p:pic>
+      <p:pic>
+        <p:nvPicPr>
+          <p:cNvPr id="10" name="Picture 9">
+            <a:extLst>
+              <a:ext uri="{FF2B5EF4-FFF2-40B4-BE49-F238E27FC236}">
+                <a16:creationId xmlns:a16="http://schemas.microsoft.com/office/drawing/2014/main" id="{959BB129-1F9F-4FA0-8F9E-4996BC0690F2}"/>
+              </a:ext>
+            </a:extLst>
+          </p:cNvPr>
+          <p:cNvPicPr>
+            <a:picLocks noChangeAspect="1"/>
+          </p:cNvPicPr>
+          <p:nvPr/>
+        </p:nvPicPr>
+        <p:blipFill>
+          <a:blip r:embed="rId3"/>
+          <a:stretch>
+            <a:fillRect/>
+          </a:stretch>
+        </p:blipFill>
+        <p:spPr>
+          <a:xfrm>
+            <a:off x="1030687" y="1727628"/>
+            <a:ext cx="3998514" cy="4502391"/>
+          </a:xfrm>
+          <a:prstGeom prst="rect">
+            <a:avLst/>
+          </a:prstGeom>
+        </p:spPr>
+      </p:pic>
+    </p:spTree>
+    <p:extLst>
+      <p:ext uri="{BB962C8B-B14F-4D97-AF65-F5344CB8AC3E}">
+        <p14:creationId xmlns:p14="http://schemas.microsoft.com/office/powerpoint/2010/main" val="2860343442"/>
+      </p:ext>
+    </p:extLst>
+  </p:cSld>
+  <p:clrMapOvr>
+    <a:masterClrMapping/>
+  </p:clrMapOvr>
+</p:sld>
+</file>
+
+<file path=ppt/slides/slide74.xml><?xml version="1.0" encoding="utf-8"?>
+<p:sld xmlns:a="http://schemas.openxmlformats.org/drawingml/2006/main" xmlns:r="http://schemas.openxmlformats.org/officeDocument/2006/relationships" xmlns:p="http://schemas.openxmlformats.org/presentationml/2006/main">
+  <p:cSld>
+    <p:spTree>
+      <p:nvGrpSpPr>
+        <p:cNvPr id="1" name=""/>
+        <p:cNvGrpSpPr/>
+        <p:nvPr/>
+      </p:nvGrpSpPr>
+      <p:grpSpPr>
+        <a:xfrm>
+          <a:off x="0" y="0"/>
+          <a:ext cx="0" cy="0"/>
+          <a:chOff x="0" y="0"/>
+          <a:chExt cx="0" cy="0"/>
+        </a:xfrm>
+      </p:grpSpPr>
+      <p:sp>
+        <p:nvSpPr>
+          <p:cNvPr id="2" name="Title 1">
+            <a:extLst>
+              <a:ext uri="{FF2B5EF4-FFF2-40B4-BE49-F238E27FC236}">
+                <a16:creationId xmlns:a16="http://schemas.microsoft.com/office/drawing/2014/main" id="{6251E21D-0742-4642-AE12-243E8830E6FF}"/>
+              </a:ext>
+            </a:extLst>
+          </p:cNvPr>
+          <p:cNvSpPr>
+            <a:spLocks noGrp="1"/>
+          </p:cNvSpPr>
+          <p:nvPr>
+            <p:ph type="title"/>
+          </p:nvPr>
+        </p:nvSpPr>
+        <p:spPr>
+          <a:xfrm>
+            <a:off x="1143000" y="285136"/>
+            <a:ext cx="9875520" cy="1356360"/>
+          </a:xfrm>
+        </p:spPr>
+        <p:txBody>
+          <a:bodyPr>
+            <a:noAutofit/>
+          </a:bodyPr>
+          <a:lstStyle/>
+          <a:p>
+            <a:pPr algn="ctr"/>
+            <a:r>
+              <a:rPr lang="en-US" sz="2400" dirty="0" err="1">
+                <a:latin typeface="Calibri" panose="020F0502020204030204" pitchFamily="34" charset="0"/>
+                <a:cs typeface="Calibri" panose="020F0502020204030204" pitchFamily="34" charset="0"/>
+              </a:rPr>
+              <a:t>Hasil</a:t>
+            </a:r>
+            <a:r>
+              <a:rPr lang="en-US" sz="2400" dirty="0"/>
+              <a:t> </a:t>
+            </a:r>
+            <a:r>
+              <a:rPr lang="en-US" sz="2400" dirty="0" err="1"/>
+              <a:t>Pengenalan</a:t>
+            </a:r>
+            <a:r>
+              <a:rPr lang="en-US" sz="2400" dirty="0"/>
+              <a:t> </a:t>
+            </a:r>
+            <a:r>
+              <a:rPr lang="en-US" sz="2400" dirty="0" err="1"/>
+              <a:t>Huruf</a:t>
+            </a:r>
+            <a:r>
+              <a:rPr lang="en-US" sz="2400" dirty="0"/>
+              <a:t> Arab Tunggal </a:t>
+            </a:r>
+            <a:r>
+              <a:rPr lang="en-US" sz="2400" dirty="0" err="1"/>
+              <a:t>dengan</a:t>
+            </a:r>
+            <a:r>
+              <a:rPr lang="en-US" sz="2400" dirty="0"/>
+              <a:t> Font </a:t>
+            </a:r>
+            <a:r>
+              <a:rPr lang="en-US" sz="2400" dirty="0" err="1"/>
+              <a:t>Nazanin</a:t>
+            </a:r>
+            <a:br>
+              <a:rPr lang="en-US" sz="2400" dirty="0"/>
+            </a:br>
+            <a:r>
+              <a:rPr lang="en-US" sz="2400" dirty="0"/>
+              <a:t> </a:t>
+            </a:r>
+            <a:r>
+              <a:rPr lang="en-US" sz="2400" dirty="0" err="1"/>
+              <a:t>Normalisasi</a:t>
+            </a:r>
+            <a:r>
+              <a:rPr lang="en-US" sz="2400" dirty="0"/>
+              <a:t> Chain code 15</a:t>
+            </a:r>
+          </a:p>
+        </p:txBody>
+      </p:sp>
+      <p:pic>
+        <p:nvPicPr>
+          <p:cNvPr id="6" name="Content Placeholder 5">
+            <a:extLst>
+              <a:ext uri="{FF2B5EF4-FFF2-40B4-BE49-F238E27FC236}">
+                <a16:creationId xmlns:a16="http://schemas.microsoft.com/office/drawing/2014/main" id="{A225A930-70E0-4628-A107-91F8F100E16A}"/>
+              </a:ext>
+            </a:extLst>
+          </p:cNvPr>
+          <p:cNvPicPr>
+            <a:picLocks noGrp="1" noChangeAspect="1"/>
+          </p:cNvPicPr>
+          <p:nvPr>
+            <p:ph idx="1"/>
+          </p:nvPr>
+        </p:nvPicPr>
+        <p:blipFill>
+          <a:blip r:embed="rId2"/>
+          <a:stretch>
+            <a:fillRect/>
+          </a:stretch>
+        </p:blipFill>
+        <p:spPr>
+          <a:xfrm>
+            <a:off x="1143000" y="1823390"/>
+            <a:ext cx="4209838" cy="4518669"/>
+          </a:xfrm>
+        </p:spPr>
+      </p:pic>
+      <p:pic>
+        <p:nvPicPr>
+          <p:cNvPr id="9" name="Picture 8">
+            <a:extLst>
+              <a:ext uri="{FF2B5EF4-FFF2-40B4-BE49-F238E27FC236}">
+                <a16:creationId xmlns:a16="http://schemas.microsoft.com/office/drawing/2014/main" id="{9336EFE9-27F2-4EB7-B4BF-C2F0767FBD66}"/>
+              </a:ext>
+            </a:extLst>
+          </p:cNvPr>
+          <p:cNvPicPr>
+            <a:picLocks noChangeAspect="1"/>
+          </p:cNvPicPr>
+          <p:nvPr/>
+        </p:nvPicPr>
+        <p:blipFill>
+          <a:blip r:embed="rId3"/>
+          <a:stretch>
+            <a:fillRect/>
+          </a:stretch>
+        </p:blipFill>
+        <p:spPr>
+          <a:xfrm>
+            <a:off x="5941267" y="1823390"/>
+            <a:ext cx="4544836" cy="4611185"/>
+          </a:xfrm>
+          <a:prstGeom prst="rect">
+            <a:avLst/>
+          </a:prstGeom>
+        </p:spPr>
+      </p:pic>
+    </p:spTree>
+    <p:extLst>
+      <p:ext uri="{BB962C8B-B14F-4D97-AF65-F5344CB8AC3E}">
+        <p14:creationId xmlns:p14="http://schemas.microsoft.com/office/powerpoint/2010/main" val="132700078"/>
+      </p:ext>
+    </p:extLst>
+  </p:cSld>
+  <p:clrMapOvr>
+    <a:masterClrMapping/>
+  </p:clrMapOvr>
+</p:sld>
+</file>
+
+<file path=ppt/slides/slide75.xml><?xml version="1.0" encoding="utf-8"?>
+<p:sld xmlns:a="http://schemas.openxmlformats.org/drawingml/2006/main" xmlns:r="http://schemas.openxmlformats.org/officeDocument/2006/relationships" xmlns:p="http://schemas.openxmlformats.org/presentationml/2006/main">
+  <p:cSld>
+    <p:spTree>
+      <p:nvGrpSpPr>
+        <p:cNvPr id="1" name=""/>
+        <p:cNvGrpSpPr/>
+        <p:nvPr/>
+      </p:nvGrpSpPr>
+      <p:grpSpPr>
+        <a:xfrm>
+          <a:off x="0" y="0"/>
+          <a:ext cx="0" cy="0"/>
+          <a:chOff x="0" y="0"/>
+          <a:chExt cx="0" cy="0"/>
+        </a:xfrm>
+      </p:grpSpPr>
+      <p:sp>
+        <p:nvSpPr>
+          <p:cNvPr id="2" name="Title 1">
+            <a:extLst>
+              <a:ext uri="{FF2B5EF4-FFF2-40B4-BE49-F238E27FC236}">
+                <a16:creationId xmlns:a16="http://schemas.microsoft.com/office/drawing/2014/main" id="{1695F01B-AA6D-4B61-9824-CDE80B45931B}"/>
+              </a:ext>
+            </a:extLst>
+          </p:cNvPr>
+          <p:cNvSpPr>
+            <a:spLocks noGrp="1"/>
+          </p:cNvSpPr>
+          <p:nvPr>
+            <p:ph type="title"/>
+          </p:nvPr>
+        </p:nvSpPr>
+        <p:spPr>
+          <a:xfrm>
+            <a:off x="1025012" y="285135"/>
+            <a:ext cx="9875520" cy="1356360"/>
+          </a:xfrm>
+        </p:spPr>
+        <p:txBody>
+          <a:bodyPr>
+            <a:noAutofit/>
+          </a:bodyPr>
+          <a:lstStyle/>
+          <a:p>
+            <a:pPr algn="ctr"/>
+            <a:r>
+              <a:rPr lang="en-US" sz="3600" dirty="0" err="1">
+                <a:latin typeface="Calibri" panose="020F0502020204030204" pitchFamily="34" charset="0"/>
+                <a:cs typeface="Calibri" panose="020F0502020204030204" pitchFamily="34" charset="0"/>
+              </a:rPr>
+              <a:t>Hasil</a:t>
+            </a:r>
+            <a:r>
+              <a:rPr lang="en-US" sz="3600" dirty="0"/>
+              <a:t> </a:t>
+            </a:r>
+            <a:r>
+              <a:rPr lang="en-US" sz="3600" dirty="0" err="1"/>
+              <a:t>Pengenalan</a:t>
+            </a:r>
+            <a:r>
+              <a:rPr lang="en-US" sz="3600" dirty="0"/>
+              <a:t> </a:t>
+            </a:r>
+            <a:r>
+              <a:rPr lang="en-US" sz="3600" dirty="0" err="1"/>
+              <a:t>Huruf</a:t>
+            </a:r>
+            <a:r>
+              <a:rPr lang="en-US" sz="3600" dirty="0"/>
+              <a:t> Arab Tunggal </a:t>
+            </a:r>
+            <a:br>
+              <a:rPr lang="en-US" sz="3600" dirty="0"/>
+            </a:br>
+            <a:r>
+              <a:rPr lang="en-US" sz="2400" dirty="0"/>
+              <a:t> Font Times New Roman</a:t>
+            </a:r>
+            <a:br>
+              <a:rPr lang="en-US" sz="2400" dirty="0"/>
+            </a:br>
+            <a:r>
+              <a:rPr lang="en-US" sz="2400" dirty="0"/>
+              <a:t> </a:t>
+            </a:r>
+            <a:r>
+              <a:rPr lang="en-US" sz="2400" dirty="0" err="1"/>
+              <a:t>Normalisasi</a:t>
+            </a:r>
+            <a:r>
+              <a:rPr lang="en-US" sz="2400" dirty="0"/>
+              <a:t> Chain code 15</a:t>
+            </a:r>
+          </a:p>
+        </p:txBody>
+      </p:sp>
+      <p:pic>
+        <p:nvPicPr>
+          <p:cNvPr id="5" name="Content Placeholder 4">
+            <a:extLst>
+              <a:ext uri="{FF2B5EF4-FFF2-40B4-BE49-F238E27FC236}">
+                <a16:creationId xmlns:a16="http://schemas.microsoft.com/office/drawing/2014/main" id="{D3A0B96C-9FD3-4D21-B2B6-4AAB3808F1F4}"/>
+              </a:ext>
+            </a:extLst>
+          </p:cNvPr>
+          <p:cNvPicPr>
+            <a:picLocks noGrp="1" noChangeAspect="1"/>
+          </p:cNvPicPr>
+          <p:nvPr>
+            <p:ph idx="1"/>
+          </p:nvPr>
+        </p:nvPicPr>
+        <p:blipFill>
+          <a:blip r:embed="rId2"/>
+          <a:stretch>
+            <a:fillRect/>
+          </a:stretch>
+        </p:blipFill>
+        <p:spPr>
+          <a:xfrm>
+            <a:off x="523567" y="2050747"/>
+            <a:ext cx="3782962" cy="4474623"/>
+          </a:xfrm>
+        </p:spPr>
+      </p:pic>
+      <p:sp>
+        <p:nvSpPr>
+          <p:cNvPr id="6" name="TextBox 5">
+            <a:extLst>
+              <a:ext uri="{FF2B5EF4-FFF2-40B4-BE49-F238E27FC236}">
+                <a16:creationId xmlns:a16="http://schemas.microsoft.com/office/drawing/2014/main" id="{C9C8311F-392B-490C-A70A-624859948B1F}"/>
+              </a:ext>
+            </a:extLst>
+          </p:cNvPr>
+          <p:cNvSpPr txBox="1"/>
+          <p:nvPr/>
+        </p:nvSpPr>
+        <p:spPr>
+          <a:xfrm>
+            <a:off x="505218" y="1656866"/>
+            <a:ext cx="1673856" cy="369332"/>
+          </a:xfrm>
+          <a:prstGeom prst="rect">
+            <a:avLst/>
+          </a:prstGeom>
+          <a:noFill/>
+        </p:spPr>
+        <p:txBody>
+          <a:bodyPr wrap="none" rtlCol="0">
+            <a:spAutoFit/>
+          </a:bodyPr>
+          <a:lstStyle/>
+          <a:p>
+            <a:r>
+              <a:rPr lang="en-US" dirty="0" err="1">
+                <a:latin typeface="Calibri" panose="020F0502020204030204" pitchFamily="34" charset="0"/>
+                <a:cs typeface="Calibri" panose="020F0502020204030204" pitchFamily="34" charset="0"/>
+              </a:rPr>
+              <a:t>Kalimat</a:t>
+            </a:r>
+            <a:r>
+              <a:rPr lang="en-US" dirty="0">
+                <a:latin typeface="Calibri" panose="020F0502020204030204" pitchFamily="34" charset="0"/>
+                <a:cs typeface="Calibri" panose="020F0502020204030204" pitchFamily="34" charset="0"/>
+              </a:rPr>
+              <a:t> test12 :</a:t>
+            </a:r>
+          </a:p>
+        </p:txBody>
+      </p:sp>
+    </p:spTree>
+    <p:extLst>
+      <p:ext uri="{BB962C8B-B14F-4D97-AF65-F5344CB8AC3E}">
+        <p14:creationId xmlns:p14="http://schemas.microsoft.com/office/powerpoint/2010/main" val="3370109158"/>
+      </p:ext>
+    </p:extLst>
+  </p:cSld>
+  <p:clrMapOvr>
+    <a:masterClrMapping/>
+  </p:clrMapOvr>
+</p:sld>
+</file>
+
+<file path=ppt/slides/slide76.xml><?xml version="1.0" encoding="utf-8"?>
+<p:sld xmlns:a="http://schemas.openxmlformats.org/drawingml/2006/main" xmlns:r="http://schemas.openxmlformats.org/officeDocument/2006/relationships" xmlns:p="http://schemas.openxmlformats.org/presentationml/2006/main">
+  <p:cSld>
+    <p:spTree>
+      <p:nvGrpSpPr>
+        <p:cNvPr id="1" name=""/>
+        <p:cNvGrpSpPr/>
+        <p:nvPr/>
+      </p:nvGrpSpPr>
+      <p:grpSpPr>
+        <a:xfrm>
+          <a:off x="0" y="0"/>
+          <a:ext cx="0" cy="0"/>
+          <a:chOff x="0" y="0"/>
+          <a:chExt cx="0" cy="0"/>
+        </a:xfrm>
+      </p:grpSpPr>
+      <p:sp>
+        <p:nvSpPr>
+          <p:cNvPr id="2" name="Title 1">
+            <a:extLst>
+              <a:ext uri="{FF2B5EF4-FFF2-40B4-BE49-F238E27FC236}">
+                <a16:creationId xmlns:a16="http://schemas.microsoft.com/office/drawing/2014/main" id="{88DC98E1-8E68-490E-89CC-AD935AC7306F}"/>
+              </a:ext>
+            </a:extLst>
+          </p:cNvPr>
+          <p:cNvSpPr>
+            <a:spLocks noGrp="1"/>
+          </p:cNvSpPr>
+          <p:nvPr>
+            <p:ph type="title"/>
+          </p:nvPr>
+        </p:nvSpPr>
+        <p:spPr/>
+        <p:txBody>
+          <a:bodyPr/>
+          <a:lstStyle/>
+          <a:p>
+            <a:r>
+              <a:rPr lang="en-US" dirty="0" err="1"/>
+              <a:t>Algoritma</a:t>
+            </a:r>
+            <a:r>
+              <a:rPr lang="en-US" dirty="0"/>
+              <a:t> </a:t>
+            </a:r>
+            <a:r>
+              <a:rPr lang="en-US" dirty="0" err="1"/>
+              <a:t>Steintiford</a:t>
+            </a:r>
+            <a:endParaRPr lang="en-US" dirty="0"/>
+          </a:p>
+        </p:txBody>
+      </p:sp>
+      <p:sp>
+        <p:nvSpPr>
+          <p:cNvPr id="3" name="Content Placeholder 2">
+            <a:extLst>
+              <a:ext uri="{FF2B5EF4-FFF2-40B4-BE49-F238E27FC236}">
+                <a16:creationId xmlns:a16="http://schemas.microsoft.com/office/drawing/2014/main" id="{1A90C74D-4D59-4C86-90D9-BF11935E38B7}"/>
+              </a:ext>
+            </a:extLst>
+          </p:cNvPr>
+          <p:cNvSpPr>
+            <a:spLocks noGrp="1"/>
+          </p:cNvSpPr>
+          <p:nvPr>
+            <p:ph idx="1"/>
+          </p:nvPr>
+        </p:nvSpPr>
+        <p:spPr>
+          <a:xfrm>
+            <a:off x="1469280" y="4114754"/>
+            <a:ext cx="9872871" cy="2202426"/>
+          </a:xfrm>
+        </p:spPr>
+        <p:txBody>
+          <a:bodyPr/>
+          <a:lstStyle/>
+          <a:p>
+            <a:r>
+              <a:rPr lang="en-US" dirty="0"/>
+              <a:t>a</a:t>
+            </a:r>
+          </a:p>
+        </p:txBody>
+      </p:sp>
+      <p:pic>
+        <p:nvPicPr>
+          <p:cNvPr id="5" name="Picture 4">
+            <a:extLst>
+              <a:ext uri="{FF2B5EF4-FFF2-40B4-BE49-F238E27FC236}">
+                <a16:creationId xmlns:a16="http://schemas.microsoft.com/office/drawing/2014/main" id="{0EEED563-510B-4976-8E21-589F5A97EDEB}"/>
+              </a:ext>
+            </a:extLst>
+          </p:cNvPr>
+          <p:cNvPicPr>
+            <a:picLocks noChangeAspect="1" noChangeArrowheads="1"/>
+          </p:cNvPicPr>
+          <p:nvPr/>
+        </p:nvPicPr>
+        <p:blipFill>
+          <a:blip r:embed="rId2">
+            <a:extLst>
+              <a:ext uri="{28A0092B-C50C-407E-A947-70E740481C1C}">
+                <a14:useLocalDpi xmlns:a14="http://schemas.microsoft.com/office/drawing/2010/main" val="0"/>
+              </a:ext>
+            </a:extLst>
+          </a:blip>
+          <a:srcRect/>
+          <a:stretch>
+            <a:fillRect/>
+          </a:stretch>
+        </p:blipFill>
+        <p:spPr bwMode="auto">
+          <a:xfrm>
+            <a:off x="1143000" y="1965960"/>
+            <a:ext cx="5486400" cy="1557338"/>
+          </a:xfrm>
+          <a:prstGeom prst="rect">
+            <a:avLst/>
+          </a:prstGeom>
+          <a:noFill/>
+          <a:ln>
+            <a:noFill/>
+          </a:ln>
+          <a:effectLst/>
+          <a:extLst>
+            <a:ext uri="{909E8E84-426E-40DD-AFC4-6F175D3DCCD1}">
+              <a14:hiddenFill xmlns:a14="http://schemas.microsoft.com/office/drawing/2010/main">
+                <a:solidFill>
+                  <a:srgbClr val="FFFFFF"/>
+                </a:solidFill>
+              </a14:hiddenFill>
+            </a:ext>
+            <a:ext uri="{91240B29-F687-4F45-9708-019B960494DF}">
+              <a14:hiddenLine xmlns:a14="http://schemas.microsoft.com/office/drawing/2010/main" w="9525">
+                <a:solidFill>
+                  <a:srgbClr val="000000"/>
+                </a:solidFill>
+                <a:miter lim="800000"/>
+                <a:headEnd/>
+                <a:tailEnd/>
+              </a14:hiddenLine>
+            </a:ext>
+            <a:ext uri="{AF507438-7753-43E0-B8FC-AC1667EBCBE1}">
+              <a14:hiddenEffects xmlns:a14="http://schemas.microsoft.com/office/drawing/2010/main">
+                <a:effectLst>
+                  <a:outerShdw dist="35921" dir="2700000" algn="ctr" rotWithShape="0">
+                    <a:srgbClr val="808080"/>
+                  </a:outerShdw>
+                </a:effectLst>
+              </a14:hiddenEffects>
+            </a:ext>
+          </a:extLst>
+        </p:spPr>
+      </p:pic>
+    </p:spTree>
+    <p:extLst>
+      <p:ext uri="{BB962C8B-B14F-4D97-AF65-F5344CB8AC3E}">
+        <p14:creationId xmlns:p14="http://schemas.microsoft.com/office/powerpoint/2010/main" val="2356313477"/>
       </p:ext>
     </p:extLst>
   </p:cSld>

</xml_diff>

<commit_message>
BAB 1 - 5
</commit_message>
<xml_diff>
--- a/1. presentasi/PEMBELAJARAN HURUF DAN KALIMAT ARAB BERBASIS PENGENALAN CITRA.pptx
+++ b/1. presentasi/PEMBELAJARAN HURUF DAN KALIMAT ARAB BERBASIS PENGENALAN CITRA.pptx
@@ -291,7 +291,7 @@
           <a:p>
             <a:fld id="{F619E0AC-3D4F-4374-89F6-BCB92F73B24F}" type="datetimeFigureOut">
               <a:rPr lang="en-US" smtClean="0"/>
-              <a:t>11/7/2017</a:t>
+              <a:t>11/22/2017</a:t>
             </a:fld>
             <a:endParaRPr lang="en-US"/>
           </a:p>
@@ -843,7 +843,7 @@
             <a:fld id="{87DE6118-2437-4B30-8E3C-4D2BE6020583}" type="datetimeFigureOut">
               <a:rPr lang="en-US" smtClean="0"/>
               <a:pPr/>
-              <a:t>11/7/2017</a:t>
+              <a:t>11/22/2017</a:t>
             </a:fld>
             <a:endParaRPr lang="en-US" dirty="0"/>
           </a:p>
@@ -1034,7 +1034,7 @@
           <a:p>
             <a:fld id="{87DE6118-2437-4B30-8E3C-4D2BE6020583}" type="datetimeFigureOut">
               <a:rPr lang="en-US" smtClean="0"/>
-              <a:t>11/7/2017</a:t>
+              <a:t>11/22/2017</a:t>
             </a:fld>
             <a:endParaRPr lang="en-US" dirty="0"/>
           </a:p>
@@ -1214,7 +1214,7 @@
           <a:p>
             <a:fld id="{87DE6118-2437-4B30-8E3C-4D2BE6020583}" type="datetimeFigureOut">
               <a:rPr lang="en-US" smtClean="0"/>
-              <a:t>11/7/2017</a:t>
+              <a:t>11/22/2017</a:t>
             </a:fld>
             <a:endParaRPr lang="en-US" dirty="0"/>
           </a:p>
@@ -1384,7 +1384,7 @@
           <a:p>
             <a:fld id="{87DE6118-2437-4B30-8E3C-4D2BE6020583}" type="datetimeFigureOut">
               <a:rPr lang="en-US" smtClean="0"/>
-              <a:t>11/7/2017</a:t>
+              <a:t>11/22/2017</a:t>
             </a:fld>
             <a:endParaRPr lang="en-US" dirty="0"/>
           </a:p>
@@ -1641,7 +1641,7 @@
             <a:fld id="{87DE6118-2437-4B30-8E3C-4D2BE6020583}" type="datetimeFigureOut">
               <a:rPr lang="en-US" smtClean="0"/>
               <a:pPr/>
-              <a:t>11/7/2017</a:t>
+              <a:t>11/22/2017</a:t>
             </a:fld>
             <a:endParaRPr lang="en-US" dirty="0"/>
           </a:p>
@@ -1930,7 +1930,7 @@
           <a:p>
             <a:fld id="{87DE6118-2437-4B30-8E3C-4D2BE6020583}" type="datetimeFigureOut">
               <a:rPr lang="en-US" smtClean="0"/>
-              <a:t>11/7/2017</a:t>
+              <a:t>11/22/2017</a:t>
             </a:fld>
             <a:endParaRPr lang="en-US" dirty="0"/>
           </a:p>
@@ -2368,7 +2368,7 @@
           <a:p>
             <a:fld id="{87DE6118-2437-4B30-8E3C-4D2BE6020583}" type="datetimeFigureOut">
               <a:rPr lang="en-US" smtClean="0"/>
-              <a:t>11/7/2017</a:t>
+              <a:t>11/22/2017</a:t>
             </a:fld>
             <a:endParaRPr lang="en-US" dirty="0"/>
           </a:p>
@@ -2486,7 +2486,7 @@
           <a:p>
             <a:fld id="{87DE6118-2437-4B30-8E3C-4D2BE6020583}" type="datetimeFigureOut">
               <a:rPr lang="en-US" smtClean="0"/>
-              <a:t>11/7/2017</a:t>
+              <a:t>11/22/2017</a:t>
             </a:fld>
             <a:endParaRPr lang="en-US" dirty="0"/>
           </a:p>
@@ -2581,7 +2581,7 @@
           <a:p>
             <a:fld id="{87DE6118-2437-4B30-8E3C-4D2BE6020583}" type="datetimeFigureOut">
               <a:rPr lang="en-US" smtClean="0"/>
-              <a:t>11/7/2017</a:t>
+              <a:t>11/22/2017</a:t>
             </a:fld>
             <a:endParaRPr lang="en-US" dirty="0"/>
           </a:p>
@@ -2938,7 +2938,7 @@
             <a:fld id="{87DE6118-2437-4B30-8E3C-4D2BE6020583}" type="datetimeFigureOut">
               <a:rPr lang="en-US" smtClean="0"/>
               <a:pPr/>
-              <a:t>11/7/2017</a:t>
+              <a:t>11/22/2017</a:t>
             </a:fld>
             <a:endParaRPr lang="en-US" dirty="0"/>
           </a:p>
@@ -3256,7 +3256,7 @@
             <a:fld id="{87DE6118-2437-4B30-8E3C-4D2BE6020583}" type="datetimeFigureOut">
               <a:rPr lang="en-US" smtClean="0"/>
               <a:pPr/>
-              <a:t>11/7/2017</a:t>
+              <a:t>11/22/2017</a:t>
             </a:fld>
             <a:endParaRPr lang="en-US" dirty="0"/>
           </a:p>
@@ -3491,7 +3491,7 @@
             <a:fld id="{87DE6118-2437-4B30-8E3C-4D2BE6020583}" type="datetimeFigureOut">
               <a:rPr lang="en-US" smtClean="0"/>
               <a:pPr/>
-              <a:t>11/7/2017</a:t>
+              <a:t>11/22/2017</a:t>
             </a:fld>
             <a:endParaRPr lang="en-US" dirty="0"/>
           </a:p>
@@ -19479,48 +19479,6 @@
           </a:fontRef>
         </p:style>
       </p:cxnSp>
-      <p:sp>
-        <p:nvSpPr>
-          <p:cNvPr id="54" name="TextBox 53"/>
-          <p:cNvSpPr txBox="1"/>
-          <p:nvPr/>
-        </p:nvSpPr>
-        <p:spPr>
-          <a:xfrm>
-            <a:off x="9663126" y="1248640"/>
-            <a:ext cx="824841" cy="461665"/>
-          </a:xfrm>
-          <a:prstGeom prst="rect">
-            <a:avLst/>
-          </a:prstGeom>
-          <a:noFill/>
-        </p:spPr>
-        <p:txBody>
-          <a:bodyPr wrap="none" rtlCol="0">
-            <a:spAutoFit/>
-          </a:bodyPr>
-          <a:lstStyle/>
-          <a:p>
-            <a:r>
-              <a:rPr lang="en-US" sz="2400" b="1" dirty="0" err="1">
-                <a:solidFill>
-                  <a:srgbClr val="0070C0"/>
-                </a:solidFill>
-                <a:latin typeface="Times New Roman" panose="02020603050405020304" pitchFamily="18" charset="0"/>
-                <a:cs typeface="Times New Roman" panose="02020603050405020304" pitchFamily="18" charset="0"/>
-              </a:rPr>
-              <a:t>Ypos</a:t>
-            </a:r>
-            <a:endParaRPr lang="en-US" sz="2400" b="1" dirty="0">
-              <a:solidFill>
-                <a:srgbClr val="0070C0"/>
-              </a:solidFill>
-              <a:latin typeface="Times New Roman" panose="02020603050405020304" pitchFamily="18" charset="0"/>
-              <a:cs typeface="Times New Roman" panose="02020603050405020304" pitchFamily="18" charset="0"/>
-            </a:endParaRPr>
-          </a:p>
-        </p:txBody>
-      </p:sp>
       <p:cxnSp>
         <p:nvCxnSpPr>
           <p:cNvPr id="56" name="Straight Arrow Connector 55"/>
@@ -19565,8 +19523,8 @@
         </p:nvSpPr>
         <p:spPr>
           <a:xfrm>
-            <a:off x="9663126" y="1692277"/>
-            <a:ext cx="2358338" cy="646331"/>
+            <a:off x="9662820" y="1309237"/>
+            <a:ext cx="1285608" cy="369332"/>
           </a:xfrm>
           <a:prstGeom prst="rect">
             <a:avLst/>
@@ -19587,7 +19545,7 @@
                 <a:latin typeface="Times New Roman" panose="02020603050405020304" pitchFamily="18" charset="0"/>
                 <a:cs typeface="Times New Roman" panose="02020603050405020304" pitchFamily="18" charset="0"/>
               </a:rPr>
-              <a:t>Piksel</a:t>
+              <a:t>Posisi</a:t>
             </a:r>
             <a:r>
               <a:rPr lang="en-US" b="1" dirty="0">
@@ -19607,69 +19565,7 @@
                 <a:latin typeface="Times New Roman" panose="02020603050405020304" pitchFamily="18" charset="0"/>
                 <a:cs typeface="Times New Roman" panose="02020603050405020304" pitchFamily="18" charset="0"/>
               </a:rPr>
-              <a:t>hitam</a:t>
-            </a:r>
-            <a:r>
-              <a:rPr lang="en-US" b="1" dirty="0">
-                <a:solidFill>
-                  <a:srgbClr val="0070C0"/>
-                </a:solidFill>
-                <a:latin typeface="Times New Roman" panose="02020603050405020304" pitchFamily="18" charset="0"/>
-                <a:cs typeface="Times New Roman" panose="02020603050405020304" pitchFamily="18" charset="0"/>
-              </a:rPr>
-              <a:t> </a:t>
-            </a:r>
-            <a:r>
-              <a:rPr lang="en-US" b="1" dirty="0" err="1">
-                <a:solidFill>
-                  <a:srgbClr val="0070C0"/>
-                </a:solidFill>
-                <a:latin typeface="Times New Roman" panose="02020603050405020304" pitchFamily="18" charset="0"/>
-                <a:cs typeface="Times New Roman" panose="02020603050405020304" pitchFamily="18" charset="0"/>
-              </a:rPr>
-              <a:t>pertama</a:t>
-            </a:r>
-            <a:r>
-              <a:rPr lang="en-US" b="1" dirty="0">
-                <a:solidFill>
-                  <a:srgbClr val="0070C0"/>
-                </a:solidFill>
-                <a:latin typeface="Times New Roman" panose="02020603050405020304" pitchFamily="18" charset="0"/>
-                <a:cs typeface="Times New Roman" panose="02020603050405020304" pitchFamily="18" charset="0"/>
-              </a:rPr>
-              <a:t> </a:t>
-            </a:r>
-          </a:p>
-          <a:p>
-            <a:r>
-              <a:rPr lang="en-US" b="1" dirty="0" err="1">
-                <a:solidFill>
-                  <a:srgbClr val="0070C0"/>
-                </a:solidFill>
-                <a:latin typeface="Times New Roman" panose="02020603050405020304" pitchFamily="18" charset="0"/>
-                <a:cs typeface="Times New Roman" panose="02020603050405020304" pitchFamily="18" charset="0"/>
-              </a:rPr>
-              <a:t>dari</a:t>
-            </a:r>
-            <a:r>
-              <a:rPr lang="en-US" b="1" dirty="0">
-                <a:solidFill>
-                  <a:srgbClr val="0070C0"/>
-                </a:solidFill>
-                <a:latin typeface="Times New Roman" panose="02020603050405020304" pitchFamily="18" charset="0"/>
-                <a:cs typeface="Times New Roman" panose="02020603050405020304" pitchFamily="18" charset="0"/>
-              </a:rPr>
-              <a:t> </a:t>
-            </a:r>
-            <a:r>
-              <a:rPr lang="en-US" b="1" dirty="0" err="1">
-                <a:solidFill>
-                  <a:srgbClr val="0070C0"/>
-                </a:solidFill>
-                <a:latin typeface="Times New Roman" panose="02020603050405020304" pitchFamily="18" charset="0"/>
-                <a:cs typeface="Times New Roman" panose="02020603050405020304" pitchFamily="18" charset="0"/>
-              </a:rPr>
-              <a:t>huruf</a:t>
+              <a:t>Titik</a:t>
             </a:r>
             <a:endParaRPr lang="en-US" b="1" dirty="0">
               <a:solidFill>

</xml_diff>